<commit_message>
feat: adicionar o status-report dia 25/08
</commit_message>
<xml_diff>
--- a/Documentação/Mod_Status_Report-PI20202 (1).pptx
+++ b/Documentação/Mod_Status_Report-PI20202 (1).pptx
@@ -7,15 +7,16 @@
     <p:sldMasterId id="2147483665" r:id="rId6"/>
   </p:sldMasterIdLst>
   <p:notesMasterIdLst>
-    <p:notesMasterId r:id="rId10"/>
+    <p:notesMasterId r:id="rId11"/>
   </p:notesMasterIdLst>
   <p:handoutMasterIdLst>
-    <p:handoutMasterId r:id="rId11"/>
+    <p:handoutMasterId r:id="rId12"/>
   </p:handoutMasterIdLst>
   <p:sldIdLst>
     <p:sldId id="256" r:id="rId7"/>
     <p:sldId id="344" r:id="rId8"/>
     <p:sldId id="471" r:id="rId9"/>
+    <p:sldId id="472" r:id="rId10"/>
   </p:sldIdLst>
   <p:sldSz cx="13442950" cy="7561263"/>
   <p:notesSz cx="7104063" cy="10234613"/>
@@ -126,6 +127,7 @@
           <p14:sldIdLst>
             <p14:sldId id="344"/>
             <p14:sldId id="471"/>
+            <p14:sldId id="472"/>
           </p14:sldIdLst>
         </p14:section>
       </p14:sectionLst>
@@ -154,975 +156,6 @@
     <p1510:client id="{7D35940C-517F-4995-9484-BD5D72CD3449}" v="3" dt="2021-02-17T21:18:26.584"/>
   </p1510:revLst>
 </p1510:revInfo>
-</file>
-
-<file path=ppt/changesInfos/changesInfo1.xml><?xml version="1.0" encoding="utf-8"?>
-<pc:chgInfo xmlns:a="http://schemas.openxmlformats.org/drawingml/2006/main" xmlns:r="http://schemas.openxmlformats.org/officeDocument/2006/relationships" xmlns:ac="http://schemas.microsoft.com/office/drawing/2013/main/command" xmlns:pc="http://schemas.microsoft.com/office/powerpoint/2013/main/command">
-  <pc:docChgLst>
-    <pc:chgData name="Alex Barreira" userId="7fd0970c-b3cf-41cb-97a8-b008d4ec6ec9" providerId="ADAL" clId="{7D35940C-517F-4995-9484-BD5D72CD3449}"/>
-    <pc:docChg chg="custSel addSld delSld modSld modSection">
-      <pc:chgData name="Alex Barreira" userId="7fd0970c-b3cf-41cb-97a8-b008d4ec6ec9" providerId="ADAL" clId="{7D35940C-517F-4995-9484-BD5D72CD3449}" dt="2021-02-17T21:18:45.447" v="243" actId="208"/>
-      <pc:docMkLst>
-        <pc:docMk/>
-      </pc:docMkLst>
-      <pc:sldChg chg="addSp delSp modSp mod">
-        <pc:chgData name="Alex Barreira" userId="7fd0970c-b3cf-41cb-97a8-b008d4ec6ec9" providerId="ADAL" clId="{7D35940C-517F-4995-9484-BD5D72CD3449}" dt="2021-02-17T21:18:45.447" v="243" actId="208"/>
-        <pc:sldMkLst>
-          <pc:docMk/>
-          <pc:sldMk cId="2008643402" sldId="471"/>
-        </pc:sldMkLst>
-        <pc:spChg chg="mod">
-          <ac:chgData name="Alex Barreira" userId="7fd0970c-b3cf-41cb-97a8-b008d4ec6ec9" providerId="ADAL" clId="{7D35940C-517F-4995-9484-BD5D72CD3449}" dt="2021-02-17T21:13:40.372" v="135"/>
-          <ac:spMkLst>
-            <pc:docMk/>
-            <pc:sldMk cId="2008643402" sldId="471"/>
-            <ac:spMk id="2" creationId="{B15BA19F-C787-4E6A-ADAB-C0DFF09C66A8}"/>
-          </ac:spMkLst>
-        </pc:spChg>
-        <pc:spChg chg="mod">
-          <ac:chgData name="Alex Barreira" userId="7fd0970c-b3cf-41cb-97a8-b008d4ec6ec9" providerId="ADAL" clId="{7D35940C-517F-4995-9484-BD5D72CD3449}" dt="2021-02-17T21:11:23.365" v="43"/>
-          <ac:spMkLst>
-            <pc:docMk/>
-            <pc:sldMk cId="2008643402" sldId="471"/>
-            <ac:spMk id="3" creationId="{00000000-0000-0000-0000-000000000000}"/>
-          </ac:spMkLst>
-        </pc:spChg>
-        <pc:spChg chg="add mod">
-          <ac:chgData name="Alex Barreira" userId="7fd0970c-b3cf-41cb-97a8-b008d4ec6ec9" providerId="ADAL" clId="{7D35940C-517F-4995-9484-BD5D72CD3449}" dt="2021-02-17T21:18:45.447" v="243" actId="208"/>
-          <ac:spMkLst>
-            <pc:docMk/>
-            <pc:sldMk cId="2008643402" sldId="471"/>
-            <ac:spMk id="5" creationId="{A1C14918-6027-46B3-96BF-C5F7FDEC3276}"/>
-          </ac:spMkLst>
-        </pc:spChg>
-        <pc:spChg chg="mod">
-          <ac:chgData name="Alex Barreira" userId="7fd0970c-b3cf-41cb-97a8-b008d4ec6ec9" providerId="ADAL" clId="{7D35940C-517F-4995-9484-BD5D72CD3449}" dt="2021-02-17T21:15:18.913" v="162" actId="1076"/>
-          <ac:spMkLst>
-            <pc:docMk/>
-            <pc:sldMk cId="2008643402" sldId="471"/>
-            <ac:spMk id="6" creationId="{70825C6F-9257-4CF5-8C62-1CA1EB2F8815}"/>
-          </ac:spMkLst>
-        </pc:spChg>
-        <pc:spChg chg="del">
-          <ac:chgData name="Alex Barreira" userId="7fd0970c-b3cf-41cb-97a8-b008d4ec6ec9" providerId="ADAL" clId="{7D35940C-517F-4995-9484-BD5D72CD3449}" dt="2021-02-17T21:15:16.098" v="161" actId="478"/>
-          <ac:spMkLst>
-            <pc:docMk/>
-            <pc:sldMk cId="2008643402" sldId="471"/>
-            <ac:spMk id="7" creationId="{DD175998-7BC4-48E7-B48B-3AD3DB555BC2}"/>
-          </ac:spMkLst>
-        </pc:spChg>
-        <pc:spChg chg="mod ord">
-          <ac:chgData name="Alex Barreira" userId="7fd0970c-b3cf-41cb-97a8-b008d4ec6ec9" providerId="ADAL" clId="{7D35940C-517F-4995-9484-BD5D72CD3449}" dt="2021-02-17T21:18:12.392" v="239" actId="1076"/>
-          <ac:spMkLst>
-            <pc:docMk/>
-            <pc:sldMk cId="2008643402" sldId="471"/>
-            <ac:spMk id="8" creationId="{5CE7D08C-795B-4BF1-97F6-F9773F4E9F4C}"/>
-          </ac:spMkLst>
-        </pc:spChg>
-        <pc:spChg chg="mod">
-          <ac:chgData name="Alex Barreira" userId="7fd0970c-b3cf-41cb-97a8-b008d4ec6ec9" providerId="ADAL" clId="{7D35940C-517F-4995-9484-BD5D72CD3449}" dt="2021-02-17T21:15:38.790" v="175" actId="1076"/>
-          <ac:spMkLst>
-            <pc:docMk/>
-            <pc:sldMk cId="2008643402" sldId="471"/>
-            <ac:spMk id="9" creationId="{B60B13C9-0C70-4C0F-82B2-D0CD4FDFC1F0}"/>
-          </ac:spMkLst>
-        </pc:spChg>
-        <pc:spChg chg="del">
-          <ac:chgData name="Alex Barreira" userId="7fd0970c-b3cf-41cb-97a8-b008d4ec6ec9" providerId="ADAL" clId="{7D35940C-517F-4995-9484-BD5D72CD3449}" dt="2021-02-17T21:15:32.901" v="172" actId="478"/>
-          <ac:spMkLst>
-            <pc:docMk/>
-            <pc:sldMk cId="2008643402" sldId="471"/>
-            <ac:spMk id="10" creationId="{2C0D7151-D7C4-4C3E-8608-61515AFD4BD7}"/>
-          </ac:spMkLst>
-        </pc:spChg>
-        <pc:spChg chg="add mod">
-          <ac:chgData name="Alex Barreira" userId="7fd0970c-b3cf-41cb-97a8-b008d4ec6ec9" providerId="ADAL" clId="{7D35940C-517F-4995-9484-BD5D72CD3449}" dt="2021-02-17T21:15:28.240" v="168" actId="1076"/>
-          <ac:spMkLst>
-            <pc:docMk/>
-            <pc:sldMk cId="2008643402" sldId="471"/>
-            <ac:spMk id="44" creationId="{2688D066-DD5D-4246-B846-8AD1218C78EC}"/>
-          </ac:spMkLst>
-        </pc:spChg>
-        <pc:spChg chg="mod">
-          <ac:chgData name="Alex Barreira" userId="7fd0970c-b3cf-41cb-97a8-b008d4ec6ec9" providerId="ADAL" clId="{7D35940C-517F-4995-9484-BD5D72CD3449}" dt="2021-02-17T21:13:55.500" v="137" actId="20577"/>
-          <ac:spMkLst>
-            <pc:docMk/>
-            <pc:sldMk cId="2008643402" sldId="471"/>
-            <ac:spMk id="63" creationId="{00000000-0000-0000-0000-000000000000}"/>
-          </ac:spMkLst>
-        </pc:spChg>
-        <pc:spChg chg="del">
-          <ac:chgData name="Alex Barreira" userId="7fd0970c-b3cf-41cb-97a8-b008d4ec6ec9" providerId="ADAL" clId="{7D35940C-517F-4995-9484-BD5D72CD3449}" dt="2021-02-17T21:14:38.999" v="150" actId="478"/>
-          <ac:spMkLst>
-            <pc:docMk/>
-            <pc:sldMk cId="2008643402" sldId="471"/>
-            <ac:spMk id="73" creationId="{00000000-0000-0000-0000-000000000000}"/>
-          </ac:spMkLst>
-        </pc:spChg>
-        <pc:spChg chg="mod">
-          <ac:chgData name="Alex Barreira" userId="7fd0970c-b3cf-41cb-97a8-b008d4ec6ec9" providerId="ADAL" clId="{7D35940C-517F-4995-9484-BD5D72CD3449}" dt="2021-02-17T21:14:35.459" v="149" actId="20577"/>
-          <ac:spMkLst>
-            <pc:docMk/>
-            <pc:sldMk cId="2008643402" sldId="471"/>
-            <ac:spMk id="78" creationId="{00000000-0000-0000-0000-000000000000}"/>
-          </ac:spMkLst>
-        </pc:spChg>
-        <pc:spChg chg="mod">
-          <ac:chgData name="Alex Barreira" userId="7fd0970c-b3cf-41cb-97a8-b008d4ec6ec9" providerId="ADAL" clId="{7D35940C-517F-4995-9484-BD5D72CD3449}" dt="2021-02-17T21:17:51.320" v="223" actId="1038"/>
-          <ac:spMkLst>
-            <pc:docMk/>
-            <pc:sldMk cId="2008643402" sldId="471"/>
-            <ac:spMk id="82" creationId="{00000000-0000-0000-0000-000000000000}"/>
-          </ac:spMkLst>
-        </pc:spChg>
-        <pc:spChg chg="mod">
-          <ac:chgData name="Alex Barreira" userId="7fd0970c-b3cf-41cb-97a8-b008d4ec6ec9" providerId="ADAL" clId="{7D35940C-517F-4995-9484-BD5D72CD3449}" dt="2021-02-17T21:16:08.066" v="181" actId="1038"/>
-          <ac:spMkLst>
-            <pc:docMk/>
-            <pc:sldMk cId="2008643402" sldId="471"/>
-            <ac:spMk id="86" creationId="{00000000-0000-0000-0000-000000000000}"/>
-          </ac:spMkLst>
-        </pc:spChg>
-        <pc:spChg chg="del mod topLvl">
-          <ac:chgData name="Alex Barreira" userId="7fd0970c-b3cf-41cb-97a8-b008d4ec6ec9" providerId="ADAL" clId="{7D35940C-517F-4995-9484-BD5D72CD3449}" dt="2021-02-17T21:14:57.206" v="152" actId="478"/>
-          <ac:spMkLst>
-            <pc:docMk/>
-            <pc:sldMk cId="2008643402" sldId="471"/>
-            <ac:spMk id="87" creationId="{00000000-0000-0000-0000-000000000000}"/>
-          </ac:spMkLst>
-        </pc:spChg>
-        <pc:spChg chg="mod topLvl">
-          <ac:chgData name="Alex Barreira" userId="7fd0970c-b3cf-41cb-97a8-b008d4ec6ec9" providerId="ADAL" clId="{7D35940C-517F-4995-9484-BD5D72CD3449}" dt="2021-02-17T21:15:14.787" v="159" actId="1076"/>
-          <ac:spMkLst>
-            <pc:docMk/>
-            <pc:sldMk cId="2008643402" sldId="471"/>
-            <ac:spMk id="88" creationId="{00000000-0000-0000-0000-000000000000}"/>
-          </ac:spMkLst>
-        </pc:spChg>
-        <pc:spChg chg="del mod topLvl">
-          <ac:chgData name="Alex Barreira" userId="7fd0970c-b3cf-41cb-97a8-b008d4ec6ec9" providerId="ADAL" clId="{7D35940C-517F-4995-9484-BD5D72CD3449}" dt="2021-02-17T21:15:10.832" v="157" actId="478"/>
-          <ac:spMkLst>
-            <pc:docMk/>
-            <pc:sldMk cId="2008643402" sldId="471"/>
-            <ac:spMk id="89" creationId="{00000000-0000-0000-0000-000000000000}"/>
-          </ac:spMkLst>
-        </pc:spChg>
-        <pc:spChg chg="del mod topLvl">
-          <ac:chgData name="Alex Barreira" userId="7fd0970c-b3cf-41cb-97a8-b008d4ec6ec9" providerId="ADAL" clId="{7D35940C-517F-4995-9484-BD5D72CD3449}" dt="2021-02-17T21:15:11.510" v="158" actId="478"/>
-          <ac:spMkLst>
-            <pc:docMk/>
-            <pc:sldMk cId="2008643402" sldId="471"/>
-            <ac:spMk id="90" creationId="{00000000-0000-0000-0000-000000000000}"/>
-          </ac:spMkLst>
-        </pc:spChg>
-        <pc:spChg chg="del mod topLvl">
-          <ac:chgData name="Alex Barreira" userId="7fd0970c-b3cf-41cb-97a8-b008d4ec6ec9" providerId="ADAL" clId="{7D35940C-517F-4995-9484-BD5D72CD3449}" dt="2021-02-17T21:15:02.736" v="153" actId="478"/>
-          <ac:spMkLst>
-            <pc:docMk/>
-            <pc:sldMk cId="2008643402" sldId="471"/>
-            <ac:spMk id="91" creationId="{00000000-0000-0000-0000-000000000000}"/>
-          </ac:spMkLst>
-        </pc:spChg>
-        <pc:spChg chg="del mod topLvl">
-          <ac:chgData name="Alex Barreira" userId="7fd0970c-b3cf-41cb-97a8-b008d4ec6ec9" providerId="ADAL" clId="{7D35940C-517F-4995-9484-BD5D72CD3449}" dt="2021-02-17T21:15:15.559" v="160" actId="478"/>
-          <ac:spMkLst>
-            <pc:docMk/>
-            <pc:sldMk cId="2008643402" sldId="471"/>
-            <ac:spMk id="100" creationId="{00000000-0000-0000-0000-000000000000}"/>
-          </ac:spMkLst>
-        </pc:spChg>
-        <pc:spChg chg="del mod topLvl">
-          <ac:chgData name="Alex Barreira" userId="7fd0970c-b3cf-41cb-97a8-b008d4ec6ec9" providerId="ADAL" clId="{7D35940C-517F-4995-9484-BD5D72CD3449}" dt="2021-02-17T21:15:19.607" v="163" actId="478"/>
-          <ac:spMkLst>
-            <pc:docMk/>
-            <pc:sldMk cId="2008643402" sldId="471"/>
-            <ac:spMk id="102" creationId="{00000000-0000-0000-0000-000000000000}"/>
-          </ac:spMkLst>
-        </pc:spChg>
-        <pc:spChg chg="del mod topLvl">
-          <ac:chgData name="Alex Barreira" userId="7fd0970c-b3cf-41cb-97a8-b008d4ec6ec9" providerId="ADAL" clId="{7D35940C-517F-4995-9484-BD5D72CD3449}" dt="2021-02-17T21:15:05.595" v="154" actId="478"/>
-          <ac:spMkLst>
-            <pc:docMk/>
-            <pc:sldMk cId="2008643402" sldId="471"/>
-            <ac:spMk id="103" creationId="{00000000-0000-0000-0000-000000000000}"/>
-          </ac:spMkLst>
-        </pc:spChg>
-        <pc:spChg chg="del mod topLvl">
-          <ac:chgData name="Alex Barreira" userId="7fd0970c-b3cf-41cb-97a8-b008d4ec6ec9" providerId="ADAL" clId="{7D35940C-517F-4995-9484-BD5D72CD3449}" dt="2021-02-17T21:15:21.685" v="165" actId="478"/>
-          <ac:spMkLst>
-            <pc:docMk/>
-            <pc:sldMk cId="2008643402" sldId="471"/>
-            <ac:spMk id="104" creationId="{00000000-0000-0000-0000-000000000000}"/>
-          </ac:spMkLst>
-        </pc:spChg>
-        <pc:spChg chg="del mod topLvl">
-          <ac:chgData name="Alex Barreira" userId="7fd0970c-b3cf-41cb-97a8-b008d4ec6ec9" providerId="ADAL" clId="{7D35940C-517F-4995-9484-BD5D72CD3449}" dt="2021-02-17T21:15:20.775" v="164" actId="478"/>
-          <ac:spMkLst>
-            <pc:docMk/>
-            <pc:sldMk cId="2008643402" sldId="471"/>
-            <ac:spMk id="105" creationId="{00000000-0000-0000-0000-000000000000}"/>
-          </ac:spMkLst>
-        </pc:spChg>
-        <pc:spChg chg="del mod topLvl">
-          <ac:chgData name="Alex Barreira" userId="7fd0970c-b3cf-41cb-97a8-b008d4ec6ec9" providerId="ADAL" clId="{7D35940C-517F-4995-9484-BD5D72CD3449}" dt="2021-02-17T21:15:22.431" v="166" actId="478"/>
-          <ac:spMkLst>
-            <pc:docMk/>
-            <pc:sldMk cId="2008643402" sldId="471"/>
-            <ac:spMk id="106" creationId="{00000000-0000-0000-0000-000000000000}"/>
-          </ac:spMkLst>
-        </pc:spChg>
-        <pc:spChg chg="del mod topLvl">
-          <ac:chgData name="Alex Barreira" userId="7fd0970c-b3cf-41cb-97a8-b008d4ec6ec9" providerId="ADAL" clId="{7D35940C-517F-4995-9484-BD5D72CD3449}" dt="2021-02-17T21:15:07.655" v="155" actId="478"/>
-          <ac:spMkLst>
-            <pc:docMk/>
-            <pc:sldMk cId="2008643402" sldId="471"/>
-            <ac:spMk id="107" creationId="{00000000-0000-0000-0000-000000000000}"/>
-          </ac:spMkLst>
-        </pc:spChg>
-        <pc:spChg chg="del mod topLvl">
-          <ac:chgData name="Alex Barreira" userId="7fd0970c-b3cf-41cb-97a8-b008d4ec6ec9" providerId="ADAL" clId="{7D35940C-517F-4995-9484-BD5D72CD3449}" dt="2021-02-17T21:15:30.521" v="169" actId="478"/>
-          <ac:spMkLst>
-            <pc:docMk/>
-            <pc:sldMk cId="2008643402" sldId="471"/>
-            <ac:spMk id="108" creationId="{00000000-0000-0000-0000-000000000000}"/>
-          </ac:spMkLst>
-        </pc:spChg>
-        <pc:spChg chg="mod topLvl">
-          <ac:chgData name="Alex Barreira" userId="7fd0970c-b3cf-41cb-97a8-b008d4ec6ec9" providerId="ADAL" clId="{7D35940C-517F-4995-9484-BD5D72CD3449}" dt="2021-02-17T21:14:51.084" v="151" actId="165"/>
-          <ac:spMkLst>
-            <pc:docMk/>
-            <pc:sldMk cId="2008643402" sldId="471"/>
-            <ac:spMk id="109" creationId="{00000000-0000-0000-0000-000000000000}"/>
-          </ac:spMkLst>
-        </pc:spChg>
-        <pc:spChg chg="del mod topLvl">
-          <ac:chgData name="Alex Barreira" userId="7fd0970c-b3cf-41cb-97a8-b008d4ec6ec9" providerId="ADAL" clId="{7D35940C-517F-4995-9484-BD5D72CD3449}" dt="2021-02-17T21:15:32.341" v="171" actId="478"/>
-          <ac:spMkLst>
-            <pc:docMk/>
-            <pc:sldMk cId="2008643402" sldId="471"/>
-            <ac:spMk id="110" creationId="{00000000-0000-0000-0000-000000000000}"/>
-          </ac:spMkLst>
-        </pc:spChg>
-        <pc:spChg chg="del mod topLvl">
-          <ac:chgData name="Alex Barreira" userId="7fd0970c-b3cf-41cb-97a8-b008d4ec6ec9" providerId="ADAL" clId="{7D35940C-517F-4995-9484-BD5D72CD3449}" dt="2021-02-17T21:15:08.516" v="156" actId="478"/>
-          <ac:spMkLst>
-            <pc:docMk/>
-            <pc:sldMk cId="2008643402" sldId="471"/>
-            <ac:spMk id="111" creationId="{00000000-0000-0000-0000-000000000000}"/>
-          </ac:spMkLst>
-        </pc:spChg>
-        <pc:spChg chg="del mod topLvl">
-          <ac:chgData name="Alex Barreira" userId="7fd0970c-b3cf-41cb-97a8-b008d4ec6ec9" providerId="ADAL" clId="{7D35940C-517F-4995-9484-BD5D72CD3449}" dt="2021-02-17T21:15:31.820" v="170" actId="478"/>
-          <ac:spMkLst>
-            <pc:docMk/>
-            <pc:sldMk cId="2008643402" sldId="471"/>
-            <ac:spMk id="113" creationId="{00000000-0000-0000-0000-000000000000}"/>
-          </ac:spMkLst>
-        </pc:spChg>
-        <pc:spChg chg="del mod topLvl">
-          <ac:chgData name="Alex Barreira" userId="7fd0970c-b3cf-41cb-97a8-b008d4ec6ec9" providerId="ADAL" clId="{7D35940C-517F-4995-9484-BD5D72CD3449}" dt="2021-02-17T21:15:35.963" v="174" actId="478"/>
-          <ac:spMkLst>
-            <pc:docMk/>
-            <pc:sldMk cId="2008643402" sldId="471"/>
-            <ac:spMk id="118" creationId="{00000000-0000-0000-0000-000000000000}"/>
-          </ac:spMkLst>
-        </pc:spChg>
-        <pc:grpChg chg="del">
-          <ac:chgData name="Alex Barreira" userId="7fd0970c-b3cf-41cb-97a8-b008d4ec6ec9" providerId="ADAL" clId="{7D35940C-517F-4995-9484-BD5D72CD3449}" dt="2021-02-17T21:14:51.084" v="151" actId="165"/>
-          <ac:grpSpMkLst>
-            <pc:docMk/>
-            <pc:sldMk cId="2008643402" sldId="471"/>
-            <ac:grpSpMk id="77" creationId="{00000000-0000-0000-0000-000000000000}"/>
-          </ac:grpSpMkLst>
-        </pc:grpChg>
-        <pc:grpChg chg="del">
-          <ac:chgData name="Alex Barreira" userId="7fd0970c-b3cf-41cb-97a8-b008d4ec6ec9" providerId="ADAL" clId="{7D35940C-517F-4995-9484-BD5D72CD3449}" dt="2021-02-17T21:14:51.084" v="151" actId="165"/>
-          <ac:grpSpMkLst>
-            <pc:docMk/>
-            <pc:sldMk cId="2008643402" sldId="471"/>
-            <ac:grpSpMk id="79" creationId="{00000000-0000-0000-0000-000000000000}"/>
-          </ac:grpSpMkLst>
-        </pc:grpChg>
-        <pc:grpChg chg="del">
-          <ac:chgData name="Alex Barreira" userId="7fd0970c-b3cf-41cb-97a8-b008d4ec6ec9" providerId="ADAL" clId="{7D35940C-517F-4995-9484-BD5D72CD3449}" dt="2021-02-17T21:14:51.084" v="151" actId="165"/>
-          <ac:grpSpMkLst>
-            <pc:docMk/>
-            <pc:sldMk cId="2008643402" sldId="471"/>
-            <ac:grpSpMk id="81" creationId="{00000000-0000-0000-0000-000000000000}"/>
-          </ac:grpSpMkLst>
-        </pc:grpChg>
-        <pc:grpChg chg="del">
-          <ac:chgData name="Alex Barreira" userId="7fd0970c-b3cf-41cb-97a8-b008d4ec6ec9" providerId="ADAL" clId="{7D35940C-517F-4995-9484-BD5D72CD3449}" dt="2021-02-17T21:14:51.084" v="151" actId="165"/>
-          <ac:grpSpMkLst>
-            <pc:docMk/>
-            <pc:sldMk cId="2008643402" sldId="471"/>
-            <ac:grpSpMk id="83" creationId="{00000000-0000-0000-0000-000000000000}"/>
-          </ac:grpSpMkLst>
-        </pc:grpChg>
-        <pc:grpChg chg="del">
-          <ac:chgData name="Alex Barreira" userId="7fd0970c-b3cf-41cb-97a8-b008d4ec6ec9" providerId="ADAL" clId="{7D35940C-517F-4995-9484-BD5D72CD3449}" dt="2021-02-17T21:14:51.084" v="151" actId="165"/>
-          <ac:grpSpMkLst>
-            <pc:docMk/>
-            <pc:sldMk cId="2008643402" sldId="471"/>
-            <ac:grpSpMk id="85" creationId="{00000000-0000-0000-0000-000000000000}"/>
-          </ac:grpSpMkLst>
-        </pc:grpChg>
-      </pc:sldChg>
-      <pc:sldChg chg="addSp delSp modSp add mod">
-        <pc:chgData name="Alex Barreira" userId="7fd0970c-b3cf-41cb-97a8-b008d4ec6ec9" providerId="ADAL" clId="{7D35940C-517F-4995-9484-BD5D72CD3449}" dt="2021-02-17T21:18:40.343" v="242" actId="208"/>
-        <pc:sldMkLst>
-          <pc:docMk/>
-          <pc:sldMk cId="3384590979" sldId="472"/>
-        </pc:sldMkLst>
-        <pc:spChg chg="mod">
-          <ac:chgData name="Alex Barreira" userId="7fd0970c-b3cf-41cb-97a8-b008d4ec6ec9" providerId="ADAL" clId="{7D35940C-517F-4995-9484-BD5D72CD3449}" dt="2021-02-17T21:13:20.694" v="134" actId="404"/>
-          <ac:spMkLst>
-            <pc:docMk/>
-            <pc:sldMk cId="3384590979" sldId="472"/>
-            <ac:spMk id="2" creationId="{B15BA19F-C787-4E6A-ADAB-C0DFF09C66A8}"/>
-          </ac:spMkLst>
-        </pc:spChg>
-        <pc:spChg chg="mod">
-          <ac:chgData name="Alex Barreira" userId="7fd0970c-b3cf-41cb-97a8-b008d4ec6ec9" providerId="ADAL" clId="{7D35940C-517F-4995-9484-BD5D72CD3449}" dt="2021-02-17T21:11:27.359" v="45" actId="20577"/>
-          <ac:spMkLst>
-            <pc:docMk/>
-            <pc:sldMk cId="3384590979" sldId="472"/>
-            <ac:spMk id="3" creationId="{00000000-0000-0000-0000-000000000000}"/>
-          </ac:spMkLst>
-        </pc:spChg>
-        <pc:spChg chg="del">
-          <ac:chgData name="Alex Barreira" userId="7fd0970c-b3cf-41cb-97a8-b008d4ec6ec9" providerId="ADAL" clId="{7D35940C-517F-4995-9484-BD5D72CD3449}" dt="2021-02-17T21:18:25.326" v="240" actId="478"/>
-          <ac:spMkLst>
-            <pc:docMk/>
-            <pc:sldMk cId="3384590979" sldId="472"/>
-            <ac:spMk id="6" creationId="{70825C6F-9257-4CF5-8C62-1CA1EB2F8815}"/>
-          </ac:spMkLst>
-        </pc:spChg>
-        <pc:spChg chg="del">
-          <ac:chgData name="Alex Barreira" userId="7fd0970c-b3cf-41cb-97a8-b008d4ec6ec9" providerId="ADAL" clId="{7D35940C-517F-4995-9484-BD5D72CD3449}" dt="2021-02-17T21:18:25.326" v="240" actId="478"/>
-          <ac:spMkLst>
-            <pc:docMk/>
-            <pc:sldMk cId="3384590979" sldId="472"/>
-            <ac:spMk id="7" creationId="{DD175998-7BC4-48E7-B48B-3AD3DB555BC2}"/>
-          </ac:spMkLst>
-        </pc:spChg>
-        <pc:spChg chg="del">
-          <ac:chgData name="Alex Barreira" userId="7fd0970c-b3cf-41cb-97a8-b008d4ec6ec9" providerId="ADAL" clId="{7D35940C-517F-4995-9484-BD5D72CD3449}" dt="2021-02-17T21:18:25.326" v="240" actId="478"/>
-          <ac:spMkLst>
-            <pc:docMk/>
-            <pc:sldMk cId="3384590979" sldId="472"/>
-            <ac:spMk id="8" creationId="{5CE7D08C-795B-4BF1-97F6-F9773F4E9F4C}"/>
-          </ac:spMkLst>
-        </pc:spChg>
-        <pc:spChg chg="del">
-          <ac:chgData name="Alex Barreira" userId="7fd0970c-b3cf-41cb-97a8-b008d4ec6ec9" providerId="ADAL" clId="{7D35940C-517F-4995-9484-BD5D72CD3449}" dt="2021-02-17T21:18:25.326" v="240" actId="478"/>
-          <ac:spMkLst>
-            <pc:docMk/>
-            <pc:sldMk cId="3384590979" sldId="472"/>
-            <ac:spMk id="9" creationId="{B60B13C9-0C70-4C0F-82B2-D0CD4FDFC1F0}"/>
-          </ac:spMkLst>
-        </pc:spChg>
-        <pc:spChg chg="del">
-          <ac:chgData name="Alex Barreira" userId="7fd0970c-b3cf-41cb-97a8-b008d4ec6ec9" providerId="ADAL" clId="{7D35940C-517F-4995-9484-BD5D72CD3449}" dt="2021-02-17T21:18:25.326" v="240" actId="478"/>
-          <ac:spMkLst>
-            <pc:docMk/>
-            <pc:sldMk cId="3384590979" sldId="472"/>
-            <ac:spMk id="10" creationId="{2C0D7151-D7C4-4C3E-8608-61515AFD4BD7}"/>
-          </ac:spMkLst>
-        </pc:spChg>
-        <pc:spChg chg="add mod">
-          <ac:chgData name="Alex Barreira" userId="7fd0970c-b3cf-41cb-97a8-b008d4ec6ec9" providerId="ADAL" clId="{7D35940C-517F-4995-9484-BD5D72CD3449}" dt="2021-02-17T21:18:26.584" v="241"/>
-          <ac:spMkLst>
-            <pc:docMk/>
-            <pc:sldMk cId="3384590979" sldId="472"/>
-            <ac:spMk id="44" creationId="{1E997FEB-A82C-4FE3-B191-DE926FE907FC}"/>
-          </ac:spMkLst>
-        </pc:spChg>
-        <pc:spChg chg="add mod">
-          <ac:chgData name="Alex Barreira" userId="7fd0970c-b3cf-41cb-97a8-b008d4ec6ec9" providerId="ADAL" clId="{7D35940C-517F-4995-9484-BD5D72CD3449}" dt="2021-02-17T21:18:26.584" v="241"/>
-          <ac:spMkLst>
-            <pc:docMk/>
-            <pc:sldMk cId="3384590979" sldId="472"/>
-            <ac:spMk id="45" creationId="{086246F5-DDAA-4D0C-90E1-F0C0FED6D98E}"/>
-          </ac:spMkLst>
-        </pc:spChg>
-        <pc:spChg chg="add mod">
-          <ac:chgData name="Alex Barreira" userId="7fd0970c-b3cf-41cb-97a8-b008d4ec6ec9" providerId="ADAL" clId="{7D35940C-517F-4995-9484-BD5D72CD3449}" dt="2021-02-17T21:18:26.584" v="241"/>
-          <ac:spMkLst>
-            <pc:docMk/>
-            <pc:sldMk cId="3384590979" sldId="472"/>
-            <ac:spMk id="46" creationId="{EDE9EB13-C574-4D80-85B2-C614186377BB}"/>
-          </ac:spMkLst>
-        </pc:spChg>
-        <pc:spChg chg="add mod">
-          <ac:chgData name="Alex Barreira" userId="7fd0970c-b3cf-41cb-97a8-b008d4ec6ec9" providerId="ADAL" clId="{7D35940C-517F-4995-9484-BD5D72CD3449}" dt="2021-02-17T21:18:26.584" v="241"/>
-          <ac:spMkLst>
-            <pc:docMk/>
-            <pc:sldMk cId="3384590979" sldId="472"/>
-            <ac:spMk id="47" creationId="{9C8F333D-81A1-4BAB-89AC-459C19DD7185}"/>
-          </ac:spMkLst>
-        </pc:spChg>
-        <pc:spChg chg="add mod">
-          <ac:chgData name="Alex Barreira" userId="7fd0970c-b3cf-41cb-97a8-b008d4ec6ec9" providerId="ADAL" clId="{7D35940C-517F-4995-9484-BD5D72CD3449}" dt="2021-02-17T21:18:26.584" v="241"/>
-          <ac:spMkLst>
-            <pc:docMk/>
-            <pc:sldMk cId="3384590979" sldId="472"/>
-            <ac:spMk id="48" creationId="{64DC5C74-7B23-4BE5-BE63-A9BD52C02CD4}"/>
-          </ac:spMkLst>
-        </pc:spChg>
-        <pc:spChg chg="add mod">
-          <ac:chgData name="Alex Barreira" userId="7fd0970c-b3cf-41cb-97a8-b008d4ec6ec9" providerId="ADAL" clId="{7D35940C-517F-4995-9484-BD5D72CD3449}" dt="2021-02-17T21:18:26.584" v="241"/>
-          <ac:spMkLst>
-            <pc:docMk/>
-            <pc:sldMk cId="3384590979" sldId="472"/>
-            <ac:spMk id="49" creationId="{1CBC8A27-FF05-44CD-B093-FB50D917E8D4}"/>
-          </ac:spMkLst>
-        </pc:spChg>
-        <pc:spChg chg="add mod">
-          <ac:chgData name="Alex Barreira" userId="7fd0970c-b3cf-41cb-97a8-b008d4ec6ec9" providerId="ADAL" clId="{7D35940C-517F-4995-9484-BD5D72CD3449}" dt="2021-02-17T21:18:26.584" v="241"/>
-          <ac:spMkLst>
-            <pc:docMk/>
-            <pc:sldMk cId="3384590979" sldId="472"/>
-            <ac:spMk id="50" creationId="{B1654790-CBD3-4D97-B9BC-CBC39DD32FC8}"/>
-          </ac:spMkLst>
-        </pc:spChg>
-        <pc:spChg chg="add mod">
-          <ac:chgData name="Alex Barreira" userId="7fd0970c-b3cf-41cb-97a8-b008d4ec6ec9" providerId="ADAL" clId="{7D35940C-517F-4995-9484-BD5D72CD3449}" dt="2021-02-17T21:18:26.584" v="241"/>
-          <ac:spMkLst>
-            <pc:docMk/>
-            <pc:sldMk cId="3384590979" sldId="472"/>
-            <ac:spMk id="51" creationId="{508E308C-5CF8-44B6-A1C4-87E5DDC4CC70}"/>
-          </ac:spMkLst>
-        </pc:spChg>
-        <pc:spChg chg="add mod">
-          <ac:chgData name="Alex Barreira" userId="7fd0970c-b3cf-41cb-97a8-b008d4ec6ec9" providerId="ADAL" clId="{7D35940C-517F-4995-9484-BD5D72CD3449}" dt="2021-02-17T21:18:26.584" v="241"/>
-          <ac:spMkLst>
-            <pc:docMk/>
-            <pc:sldMk cId="3384590979" sldId="472"/>
-            <ac:spMk id="52" creationId="{7BFB1971-EC64-4AB8-B092-E0043EABF66E}"/>
-          </ac:spMkLst>
-        </pc:spChg>
-        <pc:spChg chg="add mod">
-          <ac:chgData name="Alex Barreira" userId="7fd0970c-b3cf-41cb-97a8-b008d4ec6ec9" providerId="ADAL" clId="{7D35940C-517F-4995-9484-BD5D72CD3449}" dt="2021-02-17T21:18:26.584" v="241"/>
-          <ac:spMkLst>
-            <pc:docMk/>
-            <pc:sldMk cId="3384590979" sldId="472"/>
-            <ac:spMk id="53" creationId="{CD1D1FF9-2BFE-4742-BA82-E1804B8C0747}"/>
-          </ac:spMkLst>
-        </pc:spChg>
-        <pc:spChg chg="add mod">
-          <ac:chgData name="Alex Barreira" userId="7fd0970c-b3cf-41cb-97a8-b008d4ec6ec9" providerId="ADAL" clId="{7D35940C-517F-4995-9484-BD5D72CD3449}" dt="2021-02-17T21:18:40.343" v="242" actId="208"/>
-          <ac:spMkLst>
-            <pc:docMk/>
-            <pc:sldMk cId="3384590979" sldId="472"/>
-            <ac:spMk id="54" creationId="{1B63957F-A46D-48D5-BC08-1A2EB1CCBBE4}"/>
-          </ac:spMkLst>
-        </pc:spChg>
-        <pc:spChg chg="add mod">
-          <ac:chgData name="Alex Barreira" userId="7fd0970c-b3cf-41cb-97a8-b008d4ec6ec9" providerId="ADAL" clId="{7D35940C-517F-4995-9484-BD5D72CD3449}" dt="2021-02-17T21:18:26.584" v="241"/>
-          <ac:spMkLst>
-            <pc:docMk/>
-            <pc:sldMk cId="3384590979" sldId="472"/>
-            <ac:spMk id="55" creationId="{F371B3E2-E59C-4A0F-B5AC-74687E6B4AC8}"/>
-          </ac:spMkLst>
-        </pc:spChg>
-        <pc:spChg chg="mod">
-          <ac:chgData name="Alex Barreira" userId="7fd0970c-b3cf-41cb-97a8-b008d4ec6ec9" providerId="ADAL" clId="{7D35940C-517F-4995-9484-BD5D72CD3449}" dt="2021-02-17T21:14:02.359" v="139" actId="20577"/>
-          <ac:spMkLst>
-            <pc:docMk/>
-            <pc:sldMk cId="3384590979" sldId="472"/>
-            <ac:spMk id="63" creationId="{00000000-0000-0000-0000-000000000000}"/>
-          </ac:spMkLst>
-        </pc:spChg>
-        <pc:spChg chg="del">
-          <ac:chgData name="Alex Barreira" userId="7fd0970c-b3cf-41cb-97a8-b008d4ec6ec9" providerId="ADAL" clId="{7D35940C-517F-4995-9484-BD5D72CD3449}" dt="2021-02-17T21:18:25.326" v="240" actId="478"/>
-          <ac:spMkLst>
-            <pc:docMk/>
-            <pc:sldMk cId="3384590979" sldId="472"/>
-            <ac:spMk id="73" creationId="{00000000-0000-0000-0000-000000000000}"/>
-          </ac:spMkLst>
-        </pc:spChg>
-        <pc:spChg chg="del">
-          <ac:chgData name="Alex Barreira" userId="7fd0970c-b3cf-41cb-97a8-b008d4ec6ec9" providerId="ADAL" clId="{7D35940C-517F-4995-9484-BD5D72CD3449}" dt="2021-02-17T21:18:25.326" v="240" actId="478"/>
-          <ac:spMkLst>
-            <pc:docMk/>
-            <pc:sldMk cId="3384590979" sldId="472"/>
-            <ac:spMk id="78" creationId="{00000000-0000-0000-0000-000000000000}"/>
-          </ac:spMkLst>
-        </pc:spChg>
-        <pc:spChg chg="del">
-          <ac:chgData name="Alex Barreira" userId="7fd0970c-b3cf-41cb-97a8-b008d4ec6ec9" providerId="ADAL" clId="{7D35940C-517F-4995-9484-BD5D72CD3449}" dt="2021-02-17T21:18:25.326" v="240" actId="478"/>
-          <ac:spMkLst>
-            <pc:docMk/>
-            <pc:sldMk cId="3384590979" sldId="472"/>
-            <ac:spMk id="80" creationId="{00000000-0000-0000-0000-000000000000}"/>
-          </ac:spMkLst>
-        </pc:spChg>
-        <pc:spChg chg="del">
-          <ac:chgData name="Alex Barreira" userId="7fd0970c-b3cf-41cb-97a8-b008d4ec6ec9" providerId="ADAL" clId="{7D35940C-517F-4995-9484-BD5D72CD3449}" dt="2021-02-17T21:18:25.326" v="240" actId="478"/>
-          <ac:spMkLst>
-            <pc:docMk/>
-            <pc:sldMk cId="3384590979" sldId="472"/>
-            <ac:spMk id="82" creationId="{00000000-0000-0000-0000-000000000000}"/>
-          </ac:spMkLst>
-        </pc:spChg>
-        <pc:spChg chg="del">
-          <ac:chgData name="Alex Barreira" userId="7fd0970c-b3cf-41cb-97a8-b008d4ec6ec9" providerId="ADAL" clId="{7D35940C-517F-4995-9484-BD5D72CD3449}" dt="2021-02-17T21:18:25.326" v="240" actId="478"/>
-          <ac:spMkLst>
-            <pc:docMk/>
-            <pc:sldMk cId="3384590979" sldId="472"/>
-            <ac:spMk id="84" creationId="{00000000-0000-0000-0000-000000000000}"/>
-          </ac:spMkLst>
-        </pc:spChg>
-        <pc:spChg chg="del">
-          <ac:chgData name="Alex Barreira" userId="7fd0970c-b3cf-41cb-97a8-b008d4ec6ec9" providerId="ADAL" clId="{7D35940C-517F-4995-9484-BD5D72CD3449}" dt="2021-02-17T21:18:25.326" v="240" actId="478"/>
-          <ac:spMkLst>
-            <pc:docMk/>
-            <pc:sldMk cId="3384590979" sldId="472"/>
-            <ac:spMk id="86" creationId="{00000000-0000-0000-0000-000000000000}"/>
-          </ac:spMkLst>
-        </pc:spChg>
-        <pc:grpChg chg="del">
-          <ac:chgData name="Alex Barreira" userId="7fd0970c-b3cf-41cb-97a8-b008d4ec6ec9" providerId="ADAL" clId="{7D35940C-517F-4995-9484-BD5D72CD3449}" dt="2021-02-17T21:18:25.326" v="240" actId="478"/>
-          <ac:grpSpMkLst>
-            <pc:docMk/>
-            <pc:sldMk cId="3384590979" sldId="472"/>
-            <ac:grpSpMk id="77" creationId="{00000000-0000-0000-0000-000000000000}"/>
-          </ac:grpSpMkLst>
-        </pc:grpChg>
-        <pc:grpChg chg="del">
-          <ac:chgData name="Alex Barreira" userId="7fd0970c-b3cf-41cb-97a8-b008d4ec6ec9" providerId="ADAL" clId="{7D35940C-517F-4995-9484-BD5D72CD3449}" dt="2021-02-17T21:18:25.326" v="240" actId="478"/>
-          <ac:grpSpMkLst>
-            <pc:docMk/>
-            <pc:sldMk cId="3384590979" sldId="472"/>
-            <ac:grpSpMk id="79" creationId="{00000000-0000-0000-0000-000000000000}"/>
-          </ac:grpSpMkLst>
-        </pc:grpChg>
-        <pc:grpChg chg="del">
-          <ac:chgData name="Alex Barreira" userId="7fd0970c-b3cf-41cb-97a8-b008d4ec6ec9" providerId="ADAL" clId="{7D35940C-517F-4995-9484-BD5D72CD3449}" dt="2021-02-17T21:18:25.326" v="240" actId="478"/>
-          <ac:grpSpMkLst>
-            <pc:docMk/>
-            <pc:sldMk cId="3384590979" sldId="472"/>
-            <ac:grpSpMk id="81" creationId="{00000000-0000-0000-0000-000000000000}"/>
-          </ac:grpSpMkLst>
-        </pc:grpChg>
-        <pc:grpChg chg="del">
-          <ac:chgData name="Alex Barreira" userId="7fd0970c-b3cf-41cb-97a8-b008d4ec6ec9" providerId="ADAL" clId="{7D35940C-517F-4995-9484-BD5D72CD3449}" dt="2021-02-17T21:18:25.326" v="240" actId="478"/>
-          <ac:grpSpMkLst>
-            <pc:docMk/>
-            <pc:sldMk cId="3384590979" sldId="472"/>
-            <ac:grpSpMk id="83" creationId="{00000000-0000-0000-0000-000000000000}"/>
-          </ac:grpSpMkLst>
-        </pc:grpChg>
-        <pc:grpChg chg="del">
-          <ac:chgData name="Alex Barreira" userId="7fd0970c-b3cf-41cb-97a8-b008d4ec6ec9" providerId="ADAL" clId="{7D35940C-517F-4995-9484-BD5D72CD3449}" dt="2021-02-17T21:18:25.326" v="240" actId="478"/>
-          <ac:grpSpMkLst>
-            <pc:docMk/>
-            <pc:sldMk cId="3384590979" sldId="472"/>
-            <ac:grpSpMk id="85" creationId="{00000000-0000-0000-0000-000000000000}"/>
-          </ac:grpSpMkLst>
-        </pc:grpChg>
-      </pc:sldChg>
-      <pc:sldChg chg="del">
-        <pc:chgData name="Alex Barreira" userId="7fd0970c-b3cf-41cb-97a8-b008d4ec6ec9" providerId="ADAL" clId="{7D35940C-517F-4995-9484-BD5D72CD3449}" dt="2021-02-17T21:10:38.595" v="2" actId="47"/>
-        <pc:sldMkLst>
-          <pc:docMk/>
-          <pc:sldMk cId="3103146409" sldId="482"/>
-        </pc:sldMkLst>
-      </pc:sldChg>
-      <pc:sldChg chg="del">
-        <pc:chgData name="Alex Barreira" userId="7fd0970c-b3cf-41cb-97a8-b008d4ec6ec9" providerId="ADAL" clId="{7D35940C-517F-4995-9484-BD5D72CD3449}" dt="2021-02-17T21:10:38.227" v="1" actId="47"/>
-        <pc:sldMkLst>
-          <pc:docMk/>
-          <pc:sldMk cId="671586173" sldId="484"/>
-        </pc:sldMkLst>
-      </pc:sldChg>
-      <pc:sldChg chg="del">
-        <pc:chgData name="Alex Barreira" userId="7fd0970c-b3cf-41cb-97a8-b008d4ec6ec9" providerId="ADAL" clId="{7D35940C-517F-4995-9484-BD5D72CD3449}" dt="2021-02-17T21:10:37.747" v="0" actId="47"/>
-        <pc:sldMkLst>
-          <pc:docMk/>
-          <pc:sldMk cId="2606422970" sldId="486"/>
-        </pc:sldMkLst>
-      </pc:sldChg>
-      <pc:sldChg chg="del">
-        <pc:chgData name="Alex Barreira" userId="7fd0970c-b3cf-41cb-97a8-b008d4ec6ec9" providerId="ADAL" clId="{7D35940C-517F-4995-9484-BD5D72CD3449}" dt="2021-02-17T21:10:39.737" v="4" actId="47"/>
-        <pc:sldMkLst>
-          <pc:docMk/>
-          <pc:sldMk cId="1936218586" sldId="487"/>
-        </pc:sldMkLst>
-      </pc:sldChg>
-      <pc:sldChg chg="del">
-        <pc:chgData name="Alex Barreira" userId="7fd0970c-b3cf-41cb-97a8-b008d4ec6ec9" providerId="ADAL" clId="{7D35940C-517F-4995-9484-BD5D72CD3449}" dt="2021-02-17T21:10:39.046" v="3" actId="47"/>
-        <pc:sldMkLst>
-          <pc:docMk/>
-          <pc:sldMk cId="1935154534" sldId="488"/>
-        </pc:sldMkLst>
-      </pc:sldChg>
-      <pc:sldMasterChg chg="delSldLayout">
-        <pc:chgData name="Alex Barreira" userId="7fd0970c-b3cf-41cb-97a8-b008d4ec6ec9" providerId="ADAL" clId="{7D35940C-517F-4995-9484-BD5D72CD3449}" dt="2021-02-17T21:10:39.737" v="4" actId="47"/>
-        <pc:sldMasterMkLst>
-          <pc:docMk/>
-          <pc:sldMasterMk cId="0" sldId="2147483656"/>
-        </pc:sldMasterMkLst>
-        <pc:sldLayoutChg chg="del">
-          <pc:chgData name="Alex Barreira" userId="7fd0970c-b3cf-41cb-97a8-b008d4ec6ec9" providerId="ADAL" clId="{7D35940C-517F-4995-9484-BD5D72CD3449}" dt="2021-02-17T21:10:39.737" v="4" actId="47"/>
-          <pc:sldLayoutMkLst>
-            <pc:docMk/>
-            <pc:sldMasterMk cId="0" sldId="2147483656"/>
-            <pc:sldLayoutMk cId="3199078161" sldId="2147483668"/>
-          </pc:sldLayoutMkLst>
-        </pc:sldLayoutChg>
-        <pc:sldLayoutChg chg="del">
-          <pc:chgData name="Alex Barreira" userId="7fd0970c-b3cf-41cb-97a8-b008d4ec6ec9" providerId="ADAL" clId="{7D35940C-517F-4995-9484-BD5D72CD3449}" dt="2021-02-17T21:10:38.595" v="2" actId="47"/>
-          <pc:sldLayoutMkLst>
-            <pc:docMk/>
-            <pc:sldMasterMk cId="0" sldId="2147483656"/>
-            <pc:sldLayoutMk cId="1515222284" sldId="2147483669"/>
-          </pc:sldLayoutMkLst>
-        </pc:sldLayoutChg>
-      </pc:sldMasterChg>
-    </pc:docChg>
-  </pc:docChgLst>
-  <pc:docChgLst>
-    <pc:chgData name="Alex Barreira" userId="7fd0970c-b3cf-41cb-97a8-b008d4ec6ec9" providerId="ADAL" clId="{7E823099-46A7-4167-ACCC-148691D9D4C5}"/>
-    <pc:docChg chg="undo custSel addSld delSld modSld modSection">
-      <pc:chgData name="Alex Barreira" userId="7fd0970c-b3cf-41cb-97a8-b008d4ec6ec9" providerId="ADAL" clId="{7E823099-46A7-4167-ACCC-148691D9D4C5}" dt="2020-08-25T20:05:55.156" v="295" actId="14100"/>
-      <pc:docMkLst>
-        <pc:docMk/>
-      </pc:docMkLst>
-      <pc:sldChg chg="del">
-        <pc:chgData name="Alex Barreira" userId="7fd0970c-b3cf-41cb-97a8-b008d4ec6ec9" providerId="ADAL" clId="{7E823099-46A7-4167-ACCC-148691D9D4C5}" dt="2020-08-25T20:00:58.566" v="0" actId="47"/>
-        <pc:sldMkLst>
-          <pc:docMk/>
-          <pc:sldMk cId="3165050812" sldId="279"/>
-        </pc:sldMkLst>
-      </pc:sldChg>
-      <pc:sldChg chg="del">
-        <pc:chgData name="Alex Barreira" userId="7fd0970c-b3cf-41cb-97a8-b008d4ec6ec9" providerId="ADAL" clId="{7E823099-46A7-4167-ACCC-148691D9D4C5}" dt="2020-08-25T20:00:58.566" v="0" actId="47"/>
-        <pc:sldMkLst>
-          <pc:docMk/>
-          <pc:sldMk cId="1918936745" sldId="284"/>
-        </pc:sldMkLst>
-      </pc:sldChg>
-      <pc:sldChg chg="addSp delSp modSp mod modClrScheme chgLayout">
-        <pc:chgData name="Alex Barreira" userId="7fd0970c-b3cf-41cb-97a8-b008d4ec6ec9" providerId="ADAL" clId="{7E823099-46A7-4167-ACCC-148691D9D4C5}" dt="2020-08-25T20:04:58.876" v="281" actId="20577"/>
-        <pc:sldMkLst>
-          <pc:docMk/>
-          <pc:sldMk cId="948876888" sldId="344"/>
-        </pc:sldMkLst>
-        <pc:spChg chg="add mod ord">
-          <ac:chgData name="Alex Barreira" userId="7fd0970c-b3cf-41cb-97a8-b008d4ec6ec9" providerId="ADAL" clId="{7E823099-46A7-4167-ACCC-148691D9D4C5}" dt="2020-08-25T20:03:11.259" v="120" actId="20577"/>
-          <ac:spMkLst>
-            <pc:docMk/>
-            <pc:sldMk cId="948876888" sldId="344"/>
-            <ac:spMk id="2" creationId="{E8B0A577-E3E3-4D35-AA82-89ED5D5451DD}"/>
-          </ac:spMkLst>
-        </pc:spChg>
-        <pc:spChg chg="del mod">
-          <ac:chgData name="Alex Barreira" userId="7fd0970c-b3cf-41cb-97a8-b008d4ec6ec9" providerId="ADAL" clId="{7E823099-46A7-4167-ACCC-148691D9D4C5}" dt="2020-08-25T20:03:00.369" v="80" actId="478"/>
-          <ac:spMkLst>
-            <pc:docMk/>
-            <pc:sldMk cId="948876888" sldId="344"/>
-            <ac:spMk id="3" creationId="{00000000-0000-0000-0000-000000000000}"/>
-          </ac:spMkLst>
-        </pc:spChg>
-        <pc:spChg chg="add mod ord">
-          <ac:chgData name="Alex Barreira" userId="7fd0970c-b3cf-41cb-97a8-b008d4ec6ec9" providerId="ADAL" clId="{7E823099-46A7-4167-ACCC-148691D9D4C5}" dt="2020-08-25T20:04:58.876" v="281" actId="20577"/>
-          <ac:spMkLst>
-            <pc:docMk/>
-            <pc:sldMk cId="948876888" sldId="344"/>
-            <ac:spMk id="4" creationId="{C3037102-7C2A-48BA-B19A-E0AB7B0EF163}"/>
-          </ac:spMkLst>
-        </pc:spChg>
-      </pc:sldChg>
-      <pc:sldChg chg="del">
-        <pc:chgData name="Alex Barreira" userId="7fd0970c-b3cf-41cb-97a8-b008d4ec6ec9" providerId="ADAL" clId="{7E823099-46A7-4167-ACCC-148691D9D4C5}" dt="2020-08-25T20:00:58.566" v="0" actId="47"/>
-        <pc:sldMkLst>
-          <pc:docMk/>
-          <pc:sldMk cId="3512734678" sldId="345"/>
-        </pc:sldMkLst>
-      </pc:sldChg>
-      <pc:sldChg chg="del">
-        <pc:chgData name="Alex Barreira" userId="7fd0970c-b3cf-41cb-97a8-b008d4ec6ec9" providerId="ADAL" clId="{7E823099-46A7-4167-ACCC-148691D9D4C5}" dt="2020-08-25T20:00:58.566" v="0" actId="47"/>
-        <pc:sldMkLst>
-          <pc:docMk/>
-          <pc:sldMk cId="2372785582" sldId="418"/>
-        </pc:sldMkLst>
-      </pc:sldChg>
-      <pc:sldChg chg="del">
-        <pc:chgData name="Alex Barreira" userId="7fd0970c-b3cf-41cb-97a8-b008d4ec6ec9" providerId="ADAL" clId="{7E823099-46A7-4167-ACCC-148691D9D4C5}" dt="2020-08-25T20:00:58.566" v="0" actId="47"/>
-        <pc:sldMkLst>
-          <pc:docMk/>
-          <pc:sldMk cId="2707575184" sldId="419"/>
-        </pc:sldMkLst>
-      </pc:sldChg>
-      <pc:sldChg chg="del">
-        <pc:chgData name="Alex Barreira" userId="7fd0970c-b3cf-41cb-97a8-b008d4ec6ec9" providerId="ADAL" clId="{7E823099-46A7-4167-ACCC-148691D9D4C5}" dt="2020-08-25T20:00:58.566" v="0" actId="47"/>
-        <pc:sldMkLst>
-          <pc:docMk/>
-          <pc:sldMk cId="3062672438" sldId="432"/>
-        </pc:sldMkLst>
-      </pc:sldChg>
-      <pc:sldChg chg="del">
-        <pc:chgData name="Alex Barreira" userId="7fd0970c-b3cf-41cb-97a8-b008d4ec6ec9" providerId="ADAL" clId="{7E823099-46A7-4167-ACCC-148691D9D4C5}" dt="2020-08-25T20:00:58.566" v="0" actId="47"/>
-        <pc:sldMkLst>
-          <pc:docMk/>
-          <pc:sldMk cId="1361284261" sldId="436"/>
-        </pc:sldMkLst>
-      </pc:sldChg>
-      <pc:sldChg chg="del">
-        <pc:chgData name="Alex Barreira" userId="7fd0970c-b3cf-41cb-97a8-b008d4ec6ec9" providerId="ADAL" clId="{7E823099-46A7-4167-ACCC-148691D9D4C5}" dt="2020-08-25T20:00:58.566" v="0" actId="47"/>
-        <pc:sldMkLst>
-          <pc:docMk/>
-          <pc:sldMk cId="1982573965" sldId="440"/>
-        </pc:sldMkLst>
-      </pc:sldChg>
-      <pc:sldChg chg="del">
-        <pc:chgData name="Alex Barreira" userId="7fd0970c-b3cf-41cb-97a8-b008d4ec6ec9" providerId="ADAL" clId="{7E823099-46A7-4167-ACCC-148691D9D4C5}" dt="2020-08-25T20:00:58.566" v="0" actId="47"/>
-        <pc:sldMkLst>
-          <pc:docMk/>
-          <pc:sldMk cId="1086979068" sldId="441"/>
-        </pc:sldMkLst>
-      </pc:sldChg>
-      <pc:sldChg chg="del">
-        <pc:chgData name="Alex Barreira" userId="7fd0970c-b3cf-41cb-97a8-b008d4ec6ec9" providerId="ADAL" clId="{7E823099-46A7-4167-ACCC-148691D9D4C5}" dt="2020-08-25T20:00:58.566" v="0" actId="47"/>
-        <pc:sldMkLst>
-          <pc:docMk/>
-          <pc:sldMk cId="3930118019" sldId="442"/>
-        </pc:sldMkLst>
-      </pc:sldChg>
-      <pc:sldChg chg="del">
-        <pc:chgData name="Alex Barreira" userId="7fd0970c-b3cf-41cb-97a8-b008d4ec6ec9" providerId="ADAL" clId="{7E823099-46A7-4167-ACCC-148691D9D4C5}" dt="2020-08-25T20:00:58.566" v="0" actId="47"/>
-        <pc:sldMkLst>
-          <pc:docMk/>
-          <pc:sldMk cId="4124287145" sldId="443"/>
-        </pc:sldMkLst>
-      </pc:sldChg>
-      <pc:sldChg chg="modSp add mod">
-        <pc:chgData name="Alex Barreira" userId="7fd0970c-b3cf-41cb-97a8-b008d4ec6ec9" providerId="ADAL" clId="{7E823099-46A7-4167-ACCC-148691D9D4C5}" dt="2020-08-25T20:05:55.156" v="295" actId="14100"/>
-        <pc:sldMkLst>
-          <pc:docMk/>
-          <pc:sldMk cId="2008643402" sldId="471"/>
-        </pc:sldMkLst>
-        <pc:spChg chg="mod">
-          <ac:chgData name="Alex Barreira" userId="7fd0970c-b3cf-41cb-97a8-b008d4ec6ec9" providerId="ADAL" clId="{7E823099-46A7-4167-ACCC-148691D9D4C5}" dt="2020-08-25T20:05:17.393" v="283" actId="120"/>
-          <ac:spMkLst>
-            <pc:docMk/>
-            <pc:sldMk cId="2008643402" sldId="471"/>
-            <ac:spMk id="3" creationId="{00000000-0000-0000-0000-000000000000}"/>
-          </ac:spMkLst>
-        </pc:spChg>
-        <pc:spChg chg="mod">
-          <ac:chgData name="Alex Barreira" userId="7fd0970c-b3cf-41cb-97a8-b008d4ec6ec9" providerId="ADAL" clId="{7E823099-46A7-4167-ACCC-148691D9D4C5}" dt="2020-08-25T20:05:35.657" v="292" actId="1037"/>
-          <ac:spMkLst>
-            <pc:docMk/>
-            <pc:sldMk cId="2008643402" sldId="471"/>
-            <ac:spMk id="6" creationId="{70825C6F-9257-4CF5-8C62-1CA1EB2F8815}"/>
-          </ac:spMkLst>
-        </pc:spChg>
-        <pc:spChg chg="mod">
-          <ac:chgData name="Alex Barreira" userId="7fd0970c-b3cf-41cb-97a8-b008d4ec6ec9" providerId="ADAL" clId="{7E823099-46A7-4167-ACCC-148691D9D4C5}" dt="2020-08-25T20:05:35.657" v="292" actId="1037"/>
-          <ac:spMkLst>
-            <pc:docMk/>
-            <pc:sldMk cId="2008643402" sldId="471"/>
-            <ac:spMk id="7" creationId="{DD175998-7BC4-48E7-B48B-3AD3DB555BC2}"/>
-          </ac:spMkLst>
-        </pc:spChg>
-        <pc:spChg chg="mod">
-          <ac:chgData name="Alex Barreira" userId="7fd0970c-b3cf-41cb-97a8-b008d4ec6ec9" providerId="ADAL" clId="{7E823099-46A7-4167-ACCC-148691D9D4C5}" dt="2020-08-25T20:05:35.657" v="292" actId="1037"/>
-          <ac:spMkLst>
-            <pc:docMk/>
-            <pc:sldMk cId="2008643402" sldId="471"/>
-            <ac:spMk id="8" creationId="{5CE7D08C-795B-4BF1-97F6-F9773F4E9F4C}"/>
-          </ac:spMkLst>
-        </pc:spChg>
-        <pc:spChg chg="mod">
-          <ac:chgData name="Alex Barreira" userId="7fd0970c-b3cf-41cb-97a8-b008d4ec6ec9" providerId="ADAL" clId="{7E823099-46A7-4167-ACCC-148691D9D4C5}" dt="2020-08-25T20:05:35.657" v="292" actId="1037"/>
-          <ac:spMkLst>
-            <pc:docMk/>
-            <pc:sldMk cId="2008643402" sldId="471"/>
-            <ac:spMk id="9" creationId="{B60B13C9-0C70-4C0F-82B2-D0CD4FDFC1F0}"/>
-          </ac:spMkLst>
-        </pc:spChg>
-        <pc:spChg chg="mod">
-          <ac:chgData name="Alex Barreira" userId="7fd0970c-b3cf-41cb-97a8-b008d4ec6ec9" providerId="ADAL" clId="{7E823099-46A7-4167-ACCC-148691D9D4C5}" dt="2020-08-25T20:05:35.657" v="292" actId="1037"/>
-          <ac:spMkLst>
-            <pc:docMk/>
-            <pc:sldMk cId="2008643402" sldId="471"/>
-            <ac:spMk id="10" creationId="{2C0D7151-D7C4-4C3E-8608-61515AFD4BD7}"/>
-          </ac:spMkLst>
-        </pc:spChg>
-        <pc:spChg chg="mod">
-          <ac:chgData name="Alex Barreira" userId="7fd0970c-b3cf-41cb-97a8-b008d4ec6ec9" providerId="ADAL" clId="{7E823099-46A7-4167-ACCC-148691D9D4C5}" dt="2020-08-25T20:05:55.156" v="295" actId="14100"/>
-          <ac:spMkLst>
-            <pc:docMk/>
-            <pc:sldMk cId="2008643402" sldId="471"/>
-            <ac:spMk id="73" creationId="{00000000-0000-0000-0000-000000000000}"/>
-          </ac:spMkLst>
-        </pc:spChg>
-        <pc:spChg chg="mod">
-          <ac:chgData name="Alex Barreira" userId="7fd0970c-b3cf-41cb-97a8-b008d4ec6ec9" providerId="ADAL" clId="{7E823099-46A7-4167-ACCC-148691D9D4C5}" dt="2020-08-25T20:05:35.657" v="292" actId="1037"/>
-          <ac:spMkLst>
-            <pc:docMk/>
-            <pc:sldMk cId="2008643402" sldId="471"/>
-            <ac:spMk id="78" creationId="{00000000-0000-0000-0000-000000000000}"/>
-          </ac:spMkLst>
-        </pc:spChg>
-        <pc:spChg chg="mod">
-          <ac:chgData name="Alex Barreira" userId="7fd0970c-b3cf-41cb-97a8-b008d4ec6ec9" providerId="ADAL" clId="{7E823099-46A7-4167-ACCC-148691D9D4C5}" dt="2020-08-25T20:05:35.657" v="292" actId="1037"/>
-          <ac:spMkLst>
-            <pc:docMk/>
-            <pc:sldMk cId="2008643402" sldId="471"/>
-            <ac:spMk id="80" creationId="{00000000-0000-0000-0000-000000000000}"/>
-          </ac:spMkLst>
-        </pc:spChg>
-        <pc:spChg chg="mod">
-          <ac:chgData name="Alex Barreira" userId="7fd0970c-b3cf-41cb-97a8-b008d4ec6ec9" providerId="ADAL" clId="{7E823099-46A7-4167-ACCC-148691D9D4C5}" dt="2020-08-25T20:05:35.657" v="292" actId="1037"/>
-          <ac:spMkLst>
-            <pc:docMk/>
-            <pc:sldMk cId="2008643402" sldId="471"/>
-            <ac:spMk id="82" creationId="{00000000-0000-0000-0000-000000000000}"/>
-          </ac:spMkLst>
-        </pc:spChg>
-        <pc:spChg chg="mod">
-          <ac:chgData name="Alex Barreira" userId="7fd0970c-b3cf-41cb-97a8-b008d4ec6ec9" providerId="ADAL" clId="{7E823099-46A7-4167-ACCC-148691D9D4C5}" dt="2020-08-25T20:05:35.657" v="292" actId="1037"/>
-          <ac:spMkLst>
-            <pc:docMk/>
-            <pc:sldMk cId="2008643402" sldId="471"/>
-            <ac:spMk id="84" creationId="{00000000-0000-0000-0000-000000000000}"/>
-          </ac:spMkLst>
-        </pc:spChg>
-        <pc:spChg chg="mod">
-          <ac:chgData name="Alex Barreira" userId="7fd0970c-b3cf-41cb-97a8-b008d4ec6ec9" providerId="ADAL" clId="{7E823099-46A7-4167-ACCC-148691D9D4C5}" dt="2020-08-25T20:05:35.657" v="292" actId="1037"/>
-          <ac:spMkLst>
-            <pc:docMk/>
-            <pc:sldMk cId="2008643402" sldId="471"/>
-            <ac:spMk id="86" creationId="{00000000-0000-0000-0000-000000000000}"/>
-          </ac:spMkLst>
-        </pc:spChg>
-        <pc:grpChg chg="mod">
-          <ac:chgData name="Alex Barreira" userId="7fd0970c-b3cf-41cb-97a8-b008d4ec6ec9" providerId="ADAL" clId="{7E823099-46A7-4167-ACCC-148691D9D4C5}" dt="2020-08-25T20:05:35.657" v="292" actId="1037"/>
-          <ac:grpSpMkLst>
-            <pc:docMk/>
-            <pc:sldMk cId="2008643402" sldId="471"/>
-            <ac:grpSpMk id="77" creationId="{00000000-0000-0000-0000-000000000000}"/>
-          </ac:grpSpMkLst>
-        </pc:grpChg>
-        <pc:grpChg chg="mod">
-          <ac:chgData name="Alex Barreira" userId="7fd0970c-b3cf-41cb-97a8-b008d4ec6ec9" providerId="ADAL" clId="{7E823099-46A7-4167-ACCC-148691D9D4C5}" dt="2020-08-25T20:05:35.657" v="292" actId="1037"/>
-          <ac:grpSpMkLst>
-            <pc:docMk/>
-            <pc:sldMk cId="2008643402" sldId="471"/>
-            <ac:grpSpMk id="79" creationId="{00000000-0000-0000-0000-000000000000}"/>
-          </ac:grpSpMkLst>
-        </pc:grpChg>
-        <pc:grpChg chg="mod">
-          <ac:chgData name="Alex Barreira" userId="7fd0970c-b3cf-41cb-97a8-b008d4ec6ec9" providerId="ADAL" clId="{7E823099-46A7-4167-ACCC-148691D9D4C5}" dt="2020-08-25T20:05:35.657" v="292" actId="1037"/>
-          <ac:grpSpMkLst>
-            <pc:docMk/>
-            <pc:sldMk cId="2008643402" sldId="471"/>
-            <ac:grpSpMk id="81" creationId="{00000000-0000-0000-0000-000000000000}"/>
-          </ac:grpSpMkLst>
-        </pc:grpChg>
-        <pc:grpChg chg="mod">
-          <ac:chgData name="Alex Barreira" userId="7fd0970c-b3cf-41cb-97a8-b008d4ec6ec9" providerId="ADAL" clId="{7E823099-46A7-4167-ACCC-148691D9D4C5}" dt="2020-08-25T20:05:35.657" v="292" actId="1037"/>
-          <ac:grpSpMkLst>
-            <pc:docMk/>
-            <pc:sldMk cId="2008643402" sldId="471"/>
-            <ac:grpSpMk id="83" creationId="{00000000-0000-0000-0000-000000000000}"/>
-          </ac:grpSpMkLst>
-        </pc:grpChg>
-        <pc:grpChg chg="mod">
-          <ac:chgData name="Alex Barreira" userId="7fd0970c-b3cf-41cb-97a8-b008d4ec6ec9" providerId="ADAL" clId="{7E823099-46A7-4167-ACCC-148691D9D4C5}" dt="2020-08-25T20:05:35.657" v="292" actId="1037"/>
-          <ac:grpSpMkLst>
-            <pc:docMk/>
-            <pc:sldMk cId="2008643402" sldId="471"/>
-            <ac:grpSpMk id="85" creationId="{00000000-0000-0000-0000-000000000000}"/>
-          </ac:grpSpMkLst>
-        </pc:grpChg>
-      </pc:sldChg>
-      <pc:sldChg chg="add">
-        <pc:chgData name="Alex Barreira" userId="7fd0970c-b3cf-41cb-97a8-b008d4ec6ec9" providerId="ADAL" clId="{7E823099-46A7-4167-ACCC-148691D9D4C5}" dt="2020-08-25T20:01:20.145" v="1"/>
-        <pc:sldMkLst>
-          <pc:docMk/>
-          <pc:sldMk cId="3103146409" sldId="482"/>
-        </pc:sldMkLst>
-      </pc:sldChg>
-      <pc:sldChg chg="add">
-        <pc:chgData name="Alex Barreira" userId="7fd0970c-b3cf-41cb-97a8-b008d4ec6ec9" providerId="ADAL" clId="{7E823099-46A7-4167-ACCC-148691D9D4C5}" dt="2020-08-25T20:01:20.145" v="1"/>
-        <pc:sldMkLst>
-          <pc:docMk/>
-          <pc:sldMk cId="671586173" sldId="484"/>
-        </pc:sldMkLst>
-      </pc:sldChg>
-      <pc:sldChg chg="add">
-        <pc:chgData name="Alex Barreira" userId="7fd0970c-b3cf-41cb-97a8-b008d4ec6ec9" providerId="ADAL" clId="{7E823099-46A7-4167-ACCC-148691D9D4C5}" dt="2020-08-25T20:01:20.145" v="1"/>
-        <pc:sldMkLst>
-          <pc:docMk/>
-          <pc:sldMk cId="2606422970" sldId="486"/>
-        </pc:sldMkLst>
-      </pc:sldChg>
-      <pc:sldChg chg="add">
-        <pc:chgData name="Alex Barreira" userId="7fd0970c-b3cf-41cb-97a8-b008d4ec6ec9" providerId="ADAL" clId="{7E823099-46A7-4167-ACCC-148691D9D4C5}" dt="2020-08-25T20:01:20.145" v="1"/>
-        <pc:sldMkLst>
-          <pc:docMk/>
-          <pc:sldMk cId="1936218586" sldId="487"/>
-        </pc:sldMkLst>
-      </pc:sldChg>
-      <pc:sldChg chg="add">
-        <pc:chgData name="Alex Barreira" userId="7fd0970c-b3cf-41cb-97a8-b008d4ec6ec9" providerId="ADAL" clId="{7E823099-46A7-4167-ACCC-148691D9D4C5}" dt="2020-08-25T20:01:20.145" v="1"/>
-        <pc:sldMkLst>
-          <pc:docMk/>
-          <pc:sldMk cId="1935154534" sldId="488"/>
-        </pc:sldMkLst>
-      </pc:sldChg>
-      <pc:sldChg chg="new del">
-        <pc:chgData name="Alex Barreira" userId="7fd0970c-b3cf-41cb-97a8-b008d4ec6ec9" providerId="ADAL" clId="{7E823099-46A7-4167-ACCC-148691D9D4C5}" dt="2020-08-25T20:05:11.190" v="282" actId="47"/>
-        <pc:sldMkLst>
-          <pc:docMk/>
-          <pc:sldMk cId="3110969077" sldId="489"/>
-        </pc:sldMkLst>
-      </pc:sldChg>
-      <pc:sldChg chg="add del">
-        <pc:chgData name="Alex Barreira" userId="7fd0970c-b3cf-41cb-97a8-b008d4ec6ec9" providerId="ADAL" clId="{7E823099-46A7-4167-ACCC-148691D9D4C5}" dt="2020-08-25T20:02:40.323" v="78" actId="47"/>
-        <pc:sldMkLst>
-          <pc:docMk/>
-          <pc:sldMk cId="918598423" sldId="490"/>
-        </pc:sldMkLst>
-      </pc:sldChg>
-      <pc:sldChg chg="new del">
-        <pc:chgData name="Alex Barreira" userId="7fd0970c-b3cf-41cb-97a8-b008d4ec6ec9" providerId="ADAL" clId="{7E823099-46A7-4167-ACCC-148691D9D4C5}" dt="2020-08-25T20:04:15.801" v="248" actId="47"/>
-        <pc:sldMkLst>
-          <pc:docMk/>
-          <pc:sldMk cId="4073518245" sldId="490"/>
-        </pc:sldMkLst>
-      </pc:sldChg>
-      <pc:sldMasterChg chg="delSldLayout">
-        <pc:chgData name="Alex Barreira" userId="7fd0970c-b3cf-41cb-97a8-b008d4ec6ec9" providerId="ADAL" clId="{7E823099-46A7-4167-ACCC-148691D9D4C5}" dt="2020-08-25T20:00:58.566" v="0" actId="47"/>
-        <pc:sldMasterMkLst>
-          <pc:docMk/>
-          <pc:sldMasterMk cId="0" sldId="2147483656"/>
-        </pc:sldMasterMkLst>
-        <pc:sldLayoutChg chg="del">
-          <pc:chgData name="Alex Barreira" userId="7fd0970c-b3cf-41cb-97a8-b008d4ec6ec9" providerId="ADAL" clId="{7E823099-46A7-4167-ACCC-148691D9D4C5}" dt="2020-08-25T20:00:58.566" v="0" actId="47"/>
-          <pc:sldLayoutMkLst>
-            <pc:docMk/>
-            <pc:sldMasterMk cId="0" sldId="2147483656"/>
-            <pc:sldLayoutMk cId="3154182865" sldId="2147483667"/>
-          </pc:sldLayoutMkLst>
-        </pc:sldLayoutChg>
-        <pc:sldLayoutChg chg="del">
-          <pc:chgData name="Alex Barreira" userId="7fd0970c-b3cf-41cb-97a8-b008d4ec6ec9" providerId="ADAL" clId="{7E823099-46A7-4167-ACCC-148691D9D4C5}" dt="2020-08-25T20:00:58.566" v="0" actId="47"/>
-          <pc:sldLayoutMkLst>
-            <pc:docMk/>
-            <pc:sldMasterMk cId="0" sldId="2147483656"/>
-            <pc:sldLayoutMk cId="3084922465" sldId="2147483668"/>
-          </pc:sldLayoutMkLst>
-        </pc:sldLayoutChg>
-      </pc:sldMasterChg>
-    </pc:docChg>
-  </pc:docChgLst>
-</pc:chgInfo>
 </file>
 
 <file path=ppt/handoutMasters/handoutMaster1.xml><?xml version="1.0" encoding="utf-8"?>
@@ -1208,7 +241,7 @@
             <a:fld id="{C3CD65D1-5C11-455D-9F9A-0E035F00A0DA}" type="datetimeFigureOut">
               <a:rPr lang="pt-BR" smtClean="0"/>
               <a:pPr/>
-              <a:t>19/08/2021</a:t>
+              <a:t>25/08/2021</a:t>
             </a:fld>
             <a:endParaRPr lang="pt-BR"/>
           </a:p>
@@ -1376,7 +409,7 @@
             <a:fld id="{A05DA3EF-18EA-43DE-B1BB-402A3C558822}" type="datetimeFigureOut">
               <a:rPr lang="pt-BR" smtClean="0"/>
               <a:pPr/>
-              <a:t>19/08/2021</a:t>
+              <a:t>25/08/2021</a:t>
             </a:fld>
             <a:endParaRPr lang="pt-BR"/>
           </a:p>
@@ -1816,6 +849,99 @@
     <p:extLst>
       <p:ext uri="{BB962C8B-B14F-4D97-AF65-F5344CB8AC3E}">
         <p14:creationId xmlns:p14="http://schemas.microsoft.com/office/powerpoint/2010/main" val="4077685609"/>
+      </p:ext>
+    </p:extLst>
+  </p:cSld>
+  <p:clrMapOvr>
+    <a:masterClrMapping/>
+  </p:clrMapOvr>
+</p:notes>
+</file>
+
+<file path=ppt/notesSlides/notesSlide3.xml><?xml version="1.0" encoding="utf-8"?>
+<p:notes xmlns:a="http://schemas.openxmlformats.org/drawingml/2006/main" xmlns:r="http://schemas.openxmlformats.org/officeDocument/2006/relationships" xmlns:p="http://schemas.openxmlformats.org/presentationml/2006/main">
+  <p:cSld>
+    <p:spTree>
+      <p:nvGrpSpPr>
+        <p:cNvPr id="1" name=""/>
+        <p:cNvGrpSpPr/>
+        <p:nvPr/>
+      </p:nvGrpSpPr>
+      <p:grpSpPr>
+        <a:xfrm>
+          <a:off x="0" y="0"/>
+          <a:ext cx="0" cy="0"/>
+          <a:chOff x="0" y="0"/>
+          <a:chExt cx="0" cy="0"/>
+        </a:xfrm>
+      </p:grpSpPr>
+      <p:sp>
+        <p:nvSpPr>
+          <p:cNvPr id="2" name="Slide Image Placeholder 1"/>
+          <p:cNvSpPr>
+            <a:spLocks noGrp="1" noRot="1" noChangeAspect="1"/>
+          </p:cNvSpPr>
+          <p:nvPr>
+            <p:ph type="sldImg"/>
+          </p:nvPr>
+        </p:nvSpPr>
+        <p:spPr/>
+      </p:sp>
+      <p:sp>
+        <p:nvSpPr>
+          <p:cNvPr id="3" name="Notes Placeholder 2"/>
+          <p:cNvSpPr>
+            <a:spLocks noGrp="1"/>
+          </p:cNvSpPr>
+          <p:nvPr>
+            <p:ph type="body" idx="1"/>
+          </p:nvPr>
+        </p:nvSpPr>
+        <p:spPr/>
+        <p:txBody>
+          <a:bodyPr/>
+          <a:lstStyle/>
+          <a:p>
+            <a:endParaRPr lang="en-US"/>
+          </a:p>
+        </p:txBody>
+      </p:sp>
+      <p:sp>
+        <p:nvSpPr>
+          <p:cNvPr id="4" name="Slide Number Placeholder 3"/>
+          <p:cNvSpPr>
+            <a:spLocks noGrp="1"/>
+          </p:cNvSpPr>
+          <p:nvPr>
+            <p:ph type="sldNum" sz="quarter" idx="10"/>
+          </p:nvPr>
+        </p:nvSpPr>
+        <p:spPr/>
+        <p:txBody>
+          <a:bodyPr/>
+          <a:lstStyle/>
+          <a:p>
+            <a:fld id="{B39AF3DB-B6A1-2444-9DD8-53D016F8E638}" type="slidenum">
+              <a:rPr lang="pt-BR" smtClean="0">
+                <a:solidFill>
+                  <a:prstClr val="black"/>
+                </a:solidFill>
+              </a:rPr>
+              <a:pPr/>
+              <a:t>4</a:t>
+            </a:fld>
+            <a:endParaRPr lang="pt-BR">
+              <a:solidFill>
+                <a:prstClr val="black"/>
+              </a:solidFill>
+            </a:endParaRPr>
+          </a:p>
+        </p:txBody>
+      </p:sp>
+    </p:spTree>
+    <p:extLst>
+      <p:ext uri="{BB962C8B-B14F-4D97-AF65-F5344CB8AC3E}">
+        <p14:creationId xmlns:p14="http://schemas.microsoft.com/office/powerpoint/2010/main" val="4248016225"/>
       </p:ext>
     </p:extLst>
   </p:cSld>
@@ -25840,6 +24966,2089 @@
 </p:sld>
 </file>
 
+<file path=ppt/slides/slide4.xml><?xml version="1.0" encoding="utf-8"?>
+<p:sld xmlns:a="http://schemas.openxmlformats.org/drawingml/2006/main" xmlns:r="http://schemas.openxmlformats.org/officeDocument/2006/relationships" xmlns:p="http://schemas.openxmlformats.org/presentationml/2006/main">
+  <p:cSld>
+    <p:spTree>
+      <p:nvGrpSpPr>
+        <p:cNvPr id="1" name=""/>
+        <p:cNvGrpSpPr/>
+        <p:nvPr/>
+      </p:nvGrpSpPr>
+      <p:grpSpPr>
+        <a:xfrm>
+          <a:off x="0" y="0"/>
+          <a:ext cx="0" cy="0"/>
+          <a:chOff x="0" y="0"/>
+          <a:chExt cx="0" cy="0"/>
+        </a:xfrm>
+      </p:grpSpPr>
+      <p:sp>
+        <p:nvSpPr>
+          <p:cNvPr id="43" name="Rectangle 42"/>
+          <p:cNvSpPr/>
+          <p:nvPr/>
+        </p:nvSpPr>
+        <p:spPr>
+          <a:xfrm>
+            <a:off x="6804883" y="1106495"/>
+            <a:ext cx="6209639" cy="2235805"/>
+          </a:xfrm>
+          <a:prstGeom prst="rect">
+            <a:avLst/>
+          </a:prstGeom>
+          <a:noFill/>
+          <a:ln w="12700">
+            <a:solidFill>
+              <a:schemeClr val="bg1">
+                <a:lumMod val="50000"/>
+              </a:schemeClr>
+            </a:solidFill>
+          </a:ln>
+        </p:spPr>
+        <p:style>
+          <a:lnRef idx="2">
+            <a:schemeClr val="accent4"/>
+          </a:lnRef>
+          <a:fillRef idx="1">
+            <a:schemeClr val="lt1"/>
+          </a:fillRef>
+          <a:effectRef idx="0">
+            <a:schemeClr val="accent4"/>
+          </a:effectRef>
+          <a:fontRef idx="minor">
+            <a:schemeClr val="dk1"/>
+          </a:fontRef>
+        </p:style>
+        <p:txBody>
+          <a:bodyPr tIns="105844" rtlCol="0" anchor="t"/>
+          <a:lstStyle/>
+          <a:p>
+            <a:pPr defTabSz="672130">
+              <a:spcAft>
+                <a:spcPts val="882"/>
+              </a:spcAft>
+            </a:pPr>
+            <a:endParaRPr lang="pt-BR" sz="1470" dirty="0">
+              <a:solidFill>
+                <a:schemeClr val="tx1"/>
+              </a:solidFill>
+              <a:latin typeface="Calibri" panose="020F0502020204030204" pitchFamily="34" charset="0"/>
+              <a:cs typeface="Simplon BP Regular"/>
+            </a:endParaRPr>
+          </a:p>
+        </p:txBody>
+      </p:sp>
+      <p:sp>
+        <p:nvSpPr>
+          <p:cNvPr id="3" name="Title 2"/>
+          <p:cNvSpPr>
+            <a:spLocks noGrp="1"/>
+          </p:cNvSpPr>
+          <p:nvPr>
+            <p:ph type="title"/>
+          </p:nvPr>
+        </p:nvSpPr>
+        <p:spPr>
+          <a:xfrm>
+            <a:off x="469692" y="185232"/>
+            <a:ext cx="12098020" cy="800352"/>
+          </a:xfrm>
+        </p:spPr>
+        <p:txBody>
+          <a:bodyPr vert="horz" wrap="square" lIns="105844" tIns="0" rIns="105844" bIns="0" numCol="1" anchor="t" anchorCtr="0" compatLnSpc="1">
+            <a:prstTxWarp prst="textNoShape">
+              <a:avLst/>
+            </a:prstTxWarp>
+            <a:noAutofit/>
+          </a:bodyPr>
+          <a:lstStyle/>
+          <a:p>
+            <a:pPr algn="l">
+              <a:spcAft>
+                <a:spcPts val="882"/>
+              </a:spcAft>
+            </a:pPr>
+            <a:r>
+              <a:rPr lang="en-US" sz="2646" dirty="0">
+                <a:solidFill>
+                  <a:prstClr val="black"/>
+                </a:solidFill>
+                <a:latin typeface="Simplon Oi Headline"/>
+                <a:cs typeface="Simplon Oi Headline"/>
+              </a:rPr>
+              <a:t>SEMANA 1 - 19/08/2021 – 19/08/2021</a:t>
+            </a:r>
+          </a:p>
+        </p:txBody>
+      </p:sp>
+      <p:sp>
+        <p:nvSpPr>
+          <p:cNvPr id="78" name="TextBox 118"/>
+          <p:cNvSpPr txBox="1"/>
+          <p:nvPr/>
+        </p:nvSpPr>
+        <p:spPr>
+          <a:xfrm>
+            <a:off x="11822773" y="576471"/>
+            <a:ext cx="899678" cy="179824"/>
+          </a:xfrm>
+          <a:prstGeom prst="rect">
+            <a:avLst/>
+          </a:prstGeom>
+          <a:noFill/>
+          <a:ln w="12700">
+            <a:noFill/>
+          </a:ln>
+        </p:spPr>
+        <p:style>
+          <a:lnRef idx="2">
+            <a:schemeClr val="accent4"/>
+          </a:lnRef>
+          <a:fillRef idx="1">
+            <a:schemeClr val="lt1"/>
+          </a:fillRef>
+          <a:effectRef idx="0">
+            <a:schemeClr val="accent4"/>
+          </a:effectRef>
+          <a:fontRef idx="minor">
+            <a:schemeClr val="dk1"/>
+          </a:fontRef>
+        </p:style>
+        <p:txBody>
+          <a:bodyPr wrap="none" lIns="52922" tIns="52922" rIns="52922" bIns="0" rtlCol="0" anchor="b"/>
+          <a:lstStyle>
+            <a:defPPr>
+              <a:defRPr lang="en-US"/>
+            </a:defPPr>
+            <a:lvl1pPr algn="ctr">
+              <a:defRPr sz="1000" b="1">
+                <a:latin typeface="Simplon BP Regular"/>
+                <a:cs typeface="Simplon BP Regular"/>
+              </a:defRPr>
+            </a:lvl1pPr>
+            <a:lvl2pPr>
+              <a:defRPr>
+                <a:solidFill>
+                  <a:schemeClr val="dk1"/>
+                </a:solidFill>
+              </a:defRPr>
+            </a:lvl2pPr>
+            <a:lvl3pPr>
+              <a:defRPr>
+                <a:solidFill>
+                  <a:schemeClr val="dk1"/>
+                </a:solidFill>
+              </a:defRPr>
+            </a:lvl3pPr>
+            <a:lvl4pPr>
+              <a:defRPr>
+                <a:solidFill>
+                  <a:schemeClr val="dk1"/>
+                </a:solidFill>
+              </a:defRPr>
+            </a:lvl4pPr>
+            <a:lvl5pPr>
+              <a:defRPr>
+                <a:solidFill>
+                  <a:schemeClr val="dk1"/>
+                </a:solidFill>
+              </a:defRPr>
+            </a:lvl5pPr>
+            <a:lvl6pPr>
+              <a:defRPr>
+                <a:solidFill>
+                  <a:schemeClr val="dk1"/>
+                </a:solidFill>
+              </a:defRPr>
+            </a:lvl6pPr>
+            <a:lvl7pPr>
+              <a:defRPr>
+                <a:solidFill>
+                  <a:schemeClr val="dk1"/>
+                </a:solidFill>
+              </a:defRPr>
+            </a:lvl7pPr>
+            <a:lvl8pPr>
+              <a:defRPr>
+                <a:solidFill>
+                  <a:schemeClr val="dk1"/>
+                </a:solidFill>
+              </a:defRPr>
+            </a:lvl8pPr>
+            <a:lvl9pPr>
+              <a:defRPr>
+                <a:solidFill>
+                  <a:schemeClr val="dk1"/>
+                </a:solidFill>
+              </a:defRPr>
+            </a:lvl9pPr>
+          </a:lstStyle>
+          <a:p>
+            <a:pPr defTabSz="672130"/>
+            <a:r>
+              <a:rPr lang="pt-BR" sz="1176" b="0" dirty="0">
+                <a:solidFill>
+                  <a:prstClr val="black"/>
+                </a:solidFill>
+                <a:latin typeface="Simplon BP Bold" pitchFamily="2" charset="0"/>
+              </a:rPr>
+              <a:t>Negócios</a:t>
+            </a:r>
+          </a:p>
+        </p:txBody>
+      </p:sp>
+      <p:sp>
+        <p:nvSpPr>
+          <p:cNvPr id="109" name="Oval 120"/>
+          <p:cNvSpPr>
+            <a:spLocks noChangeAspect="1"/>
+          </p:cNvSpPr>
+          <p:nvPr/>
+        </p:nvSpPr>
+        <p:spPr>
+          <a:xfrm>
+            <a:off x="11193898" y="297930"/>
+            <a:ext cx="211404" cy="211689"/>
+          </a:xfrm>
+          <a:prstGeom prst="ellipse">
+            <a:avLst/>
+          </a:prstGeom>
+          <a:solidFill>
+            <a:srgbClr val="00B050"/>
+          </a:solidFill>
+          <a:ln w="12700">
+            <a:solidFill>
+              <a:schemeClr val="accent3"/>
+            </a:solidFill>
+          </a:ln>
+        </p:spPr>
+        <p:style>
+          <a:lnRef idx="2">
+            <a:schemeClr val="accent1">
+              <a:shade val="50000"/>
+            </a:schemeClr>
+          </a:lnRef>
+          <a:fillRef idx="1">
+            <a:schemeClr val="accent1"/>
+          </a:fillRef>
+          <a:effectRef idx="0">
+            <a:schemeClr val="accent1"/>
+          </a:effectRef>
+          <a:fontRef idx="minor">
+            <a:schemeClr val="lt1"/>
+          </a:fontRef>
+        </p:style>
+        <p:txBody>
+          <a:bodyPr wrap="none" lIns="52922" tIns="52922" rIns="52922" rtlCol="0" anchor="ctr"/>
+          <a:lstStyle/>
+          <a:p>
+            <a:pPr algn="ctr" defTabSz="672130"/>
+            <a:endParaRPr lang="en-US" sz="1176" dirty="0">
+              <a:solidFill>
+                <a:prstClr val="black"/>
+              </a:solidFill>
+              <a:latin typeface="Simplon BP Regular"/>
+              <a:cs typeface="Simplon BP Regular"/>
+            </a:endParaRPr>
+          </a:p>
+        </p:txBody>
+      </p:sp>
+      <p:sp>
+        <p:nvSpPr>
+          <p:cNvPr id="80" name="TextBox 123"/>
+          <p:cNvSpPr txBox="1"/>
+          <p:nvPr/>
+        </p:nvSpPr>
+        <p:spPr>
+          <a:xfrm>
+            <a:off x="10852497" y="576471"/>
+            <a:ext cx="899678" cy="179824"/>
+          </a:xfrm>
+          <a:prstGeom prst="rect">
+            <a:avLst/>
+          </a:prstGeom>
+          <a:noFill/>
+          <a:ln w="12700">
+            <a:noFill/>
+          </a:ln>
+        </p:spPr>
+        <p:style>
+          <a:lnRef idx="2">
+            <a:schemeClr val="accent4"/>
+          </a:lnRef>
+          <a:fillRef idx="1">
+            <a:schemeClr val="lt1"/>
+          </a:fillRef>
+          <a:effectRef idx="0">
+            <a:schemeClr val="accent4"/>
+          </a:effectRef>
+          <a:fontRef idx="minor">
+            <a:schemeClr val="dk1"/>
+          </a:fontRef>
+        </p:style>
+        <p:txBody>
+          <a:bodyPr wrap="none" lIns="52922" tIns="52922" rIns="52922" bIns="0" rtlCol="0" anchor="b"/>
+          <a:lstStyle>
+            <a:defPPr>
+              <a:defRPr lang="en-US"/>
+            </a:defPPr>
+            <a:lvl1pPr algn="ctr">
+              <a:defRPr sz="1000" b="1">
+                <a:latin typeface="Simplon BP Regular"/>
+                <a:cs typeface="Simplon BP Regular"/>
+              </a:defRPr>
+            </a:lvl1pPr>
+            <a:lvl2pPr>
+              <a:defRPr>
+                <a:solidFill>
+                  <a:schemeClr val="dk1"/>
+                </a:solidFill>
+              </a:defRPr>
+            </a:lvl2pPr>
+            <a:lvl3pPr>
+              <a:defRPr>
+                <a:solidFill>
+                  <a:schemeClr val="dk1"/>
+                </a:solidFill>
+              </a:defRPr>
+            </a:lvl3pPr>
+            <a:lvl4pPr>
+              <a:defRPr>
+                <a:solidFill>
+                  <a:schemeClr val="dk1"/>
+                </a:solidFill>
+              </a:defRPr>
+            </a:lvl4pPr>
+            <a:lvl5pPr>
+              <a:defRPr>
+                <a:solidFill>
+                  <a:schemeClr val="dk1"/>
+                </a:solidFill>
+              </a:defRPr>
+            </a:lvl5pPr>
+            <a:lvl6pPr>
+              <a:defRPr>
+                <a:solidFill>
+                  <a:schemeClr val="dk1"/>
+                </a:solidFill>
+              </a:defRPr>
+            </a:lvl6pPr>
+            <a:lvl7pPr>
+              <a:defRPr>
+                <a:solidFill>
+                  <a:schemeClr val="dk1"/>
+                </a:solidFill>
+              </a:defRPr>
+            </a:lvl7pPr>
+            <a:lvl8pPr>
+              <a:defRPr>
+                <a:solidFill>
+                  <a:schemeClr val="dk1"/>
+                </a:solidFill>
+              </a:defRPr>
+            </a:lvl8pPr>
+            <a:lvl9pPr>
+              <a:defRPr>
+                <a:solidFill>
+                  <a:schemeClr val="dk1"/>
+                </a:solidFill>
+              </a:defRPr>
+            </a:lvl9pPr>
+          </a:lstStyle>
+          <a:p>
+            <a:pPr defTabSz="672130"/>
+            <a:r>
+              <a:rPr lang="pt-BR" sz="1176" b="0" dirty="0">
+                <a:solidFill>
+                  <a:prstClr val="black"/>
+                </a:solidFill>
+                <a:latin typeface="Simplon BP Bold" pitchFamily="2" charset="0"/>
+              </a:rPr>
+              <a:t>Plataforma</a:t>
+            </a:r>
+          </a:p>
+        </p:txBody>
+      </p:sp>
+      <p:sp>
+        <p:nvSpPr>
+          <p:cNvPr id="82" name="TextBox 128"/>
+          <p:cNvSpPr txBox="1"/>
+          <p:nvPr/>
+        </p:nvSpPr>
+        <p:spPr>
+          <a:xfrm>
+            <a:off x="9854245" y="576471"/>
+            <a:ext cx="899678" cy="179824"/>
+          </a:xfrm>
+          <a:prstGeom prst="rect">
+            <a:avLst/>
+          </a:prstGeom>
+          <a:noFill/>
+          <a:ln w="12700">
+            <a:noFill/>
+          </a:ln>
+        </p:spPr>
+        <p:style>
+          <a:lnRef idx="2">
+            <a:schemeClr val="accent4"/>
+          </a:lnRef>
+          <a:fillRef idx="1">
+            <a:schemeClr val="lt1"/>
+          </a:fillRef>
+          <a:effectRef idx="0">
+            <a:schemeClr val="accent4"/>
+          </a:effectRef>
+          <a:fontRef idx="minor">
+            <a:schemeClr val="dk1"/>
+          </a:fontRef>
+        </p:style>
+        <p:txBody>
+          <a:bodyPr wrap="none" lIns="52922" tIns="52922" rIns="52922" bIns="0" rtlCol="0" anchor="b"/>
+          <a:lstStyle>
+            <a:defPPr>
+              <a:defRPr lang="en-US"/>
+            </a:defPPr>
+            <a:lvl1pPr algn="ctr">
+              <a:defRPr sz="1000" b="1">
+                <a:latin typeface="Simplon BP Regular"/>
+                <a:cs typeface="Simplon BP Regular"/>
+              </a:defRPr>
+            </a:lvl1pPr>
+            <a:lvl2pPr>
+              <a:defRPr>
+                <a:solidFill>
+                  <a:schemeClr val="dk1"/>
+                </a:solidFill>
+              </a:defRPr>
+            </a:lvl2pPr>
+            <a:lvl3pPr>
+              <a:defRPr>
+                <a:solidFill>
+                  <a:schemeClr val="dk1"/>
+                </a:solidFill>
+              </a:defRPr>
+            </a:lvl3pPr>
+            <a:lvl4pPr>
+              <a:defRPr>
+                <a:solidFill>
+                  <a:schemeClr val="dk1"/>
+                </a:solidFill>
+              </a:defRPr>
+            </a:lvl4pPr>
+            <a:lvl5pPr>
+              <a:defRPr>
+                <a:solidFill>
+                  <a:schemeClr val="dk1"/>
+                </a:solidFill>
+              </a:defRPr>
+            </a:lvl5pPr>
+            <a:lvl6pPr>
+              <a:defRPr>
+                <a:solidFill>
+                  <a:schemeClr val="dk1"/>
+                </a:solidFill>
+              </a:defRPr>
+            </a:lvl6pPr>
+            <a:lvl7pPr>
+              <a:defRPr>
+                <a:solidFill>
+                  <a:schemeClr val="dk1"/>
+                </a:solidFill>
+              </a:defRPr>
+            </a:lvl7pPr>
+            <a:lvl8pPr>
+              <a:defRPr>
+                <a:solidFill>
+                  <a:schemeClr val="dk1"/>
+                </a:solidFill>
+              </a:defRPr>
+            </a:lvl8pPr>
+            <a:lvl9pPr>
+              <a:defRPr>
+                <a:solidFill>
+                  <a:schemeClr val="dk1"/>
+                </a:solidFill>
+              </a:defRPr>
+            </a:lvl9pPr>
+          </a:lstStyle>
+          <a:p>
+            <a:pPr defTabSz="672130"/>
+            <a:r>
+              <a:rPr lang="pt-BR" sz="1176" b="0" dirty="0">
+                <a:solidFill>
+                  <a:prstClr val="black"/>
+                </a:solidFill>
+                <a:latin typeface="Simplon BP Bold" pitchFamily="2" charset="0"/>
+              </a:rPr>
+              <a:t>Back</a:t>
+            </a:r>
+          </a:p>
+        </p:txBody>
+      </p:sp>
+      <p:sp>
+        <p:nvSpPr>
+          <p:cNvPr id="84" name="TextBox 133"/>
+          <p:cNvSpPr txBox="1"/>
+          <p:nvPr/>
+        </p:nvSpPr>
+        <p:spPr>
+          <a:xfrm>
+            <a:off x="8934246" y="576471"/>
+            <a:ext cx="899678" cy="179824"/>
+          </a:xfrm>
+          <a:prstGeom prst="rect">
+            <a:avLst/>
+          </a:prstGeom>
+          <a:noFill/>
+          <a:ln w="12700">
+            <a:noFill/>
+          </a:ln>
+        </p:spPr>
+        <p:style>
+          <a:lnRef idx="2">
+            <a:schemeClr val="accent4"/>
+          </a:lnRef>
+          <a:fillRef idx="1">
+            <a:schemeClr val="lt1"/>
+          </a:fillRef>
+          <a:effectRef idx="0">
+            <a:schemeClr val="accent4"/>
+          </a:effectRef>
+          <a:fontRef idx="minor">
+            <a:schemeClr val="dk1"/>
+          </a:fontRef>
+        </p:style>
+        <p:txBody>
+          <a:bodyPr wrap="none" lIns="52922" tIns="52922" rIns="52922" bIns="0" rtlCol="0" anchor="b"/>
+          <a:lstStyle>
+            <a:defPPr>
+              <a:defRPr lang="en-US"/>
+            </a:defPPr>
+            <a:lvl1pPr algn="ctr">
+              <a:defRPr sz="1000" b="1">
+                <a:latin typeface="Simplon BP Regular"/>
+                <a:cs typeface="Simplon BP Regular"/>
+              </a:defRPr>
+            </a:lvl1pPr>
+            <a:lvl2pPr>
+              <a:defRPr>
+                <a:solidFill>
+                  <a:schemeClr val="dk1"/>
+                </a:solidFill>
+              </a:defRPr>
+            </a:lvl2pPr>
+            <a:lvl3pPr>
+              <a:defRPr>
+                <a:solidFill>
+                  <a:schemeClr val="dk1"/>
+                </a:solidFill>
+              </a:defRPr>
+            </a:lvl3pPr>
+            <a:lvl4pPr>
+              <a:defRPr>
+                <a:solidFill>
+                  <a:schemeClr val="dk1"/>
+                </a:solidFill>
+              </a:defRPr>
+            </a:lvl4pPr>
+            <a:lvl5pPr>
+              <a:defRPr>
+                <a:solidFill>
+                  <a:schemeClr val="dk1"/>
+                </a:solidFill>
+              </a:defRPr>
+            </a:lvl5pPr>
+            <a:lvl6pPr>
+              <a:defRPr>
+                <a:solidFill>
+                  <a:schemeClr val="dk1"/>
+                </a:solidFill>
+              </a:defRPr>
+            </a:lvl6pPr>
+            <a:lvl7pPr>
+              <a:defRPr>
+                <a:solidFill>
+                  <a:schemeClr val="dk1"/>
+                </a:solidFill>
+              </a:defRPr>
+            </a:lvl7pPr>
+            <a:lvl8pPr>
+              <a:defRPr>
+                <a:solidFill>
+                  <a:schemeClr val="dk1"/>
+                </a:solidFill>
+              </a:defRPr>
+            </a:lvl8pPr>
+            <a:lvl9pPr>
+              <a:defRPr>
+                <a:solidFill>
+                  <a:schemeClr val="dk1"/>
+                </a:solidFill>
+              </a:defRPr>
+            </a:lvl9pPr>
+          </a:lstStyle>
+          <a:p>
+            <a:pPr defTabSz="672130"/>
+            <a:r>
+              <a:rPr lang="pt-BR" sz="1176" b="0" dirty="0">
+                <a:solidFill>
+                  <a:prstClr val="black"/>
+                </a:solidFill>
+                <a:latin typeface="Simplon BP Bold" pitchFamily="2" charset="0"/>
+              </a:rPr>
+              <a:t>Front</a:t>
+            </a:r>
+          </a:p>
+        </p:txBody>
+      </p:sp>
+      <p:sp>
+        <p:nvSpPr>
+          <p:cNvPr id="88" name="Oval 134"/>
+          <p:cNvSpPr>
+            <a:spLocks noChangeAspect="1"/>
+          </p:cNvSpPr>
+          <p:nvPr/>
+        </p:nvSpPr>
+        <p:spPr>
+          <a:xfrm>
+            <a:off x="8443555" y="282529"/>
+            <a:ext cx="211404" cy="211689"/>
+          </a:xfrm>
+          <a:prstGeom prst="ellipse">
+            <a:avLst/>
+          </a:prstGeom>
+          <a:solidFill>
+            <a:srgbClr val="00B050"/>
+          </a:solidFill>
+          <a:ln w="12700">
+            <a:solidFill>
+              <a:schemeClr val="accent3"/>
+            </a:solidFill>
+          </a:ln>
+        </p:spPr>
+        <p:style>
+          <a:lnRef idx="2">
+            <a:schemeClr val="accent1">
+              <a:shade val="50000"/>
+            </a:schemeClr>
+          </a:lnRef>
+          <a:fillRef idx="1">
+            <a:schemeClr val="accent1"/>
+          </a:fillRef>
+          <a:effectRef idx="0">
+            <a:schemeClr val="accent1"/>
+          </a:effectRef>
+          <a:fontRef idx="minor">
+            <a:schemeClr val="lt1"/>
+          </a:fontRef>
+        </p:style>
+        <p:txBody>
+          <a:bodyPr wrap="none" lIns="52922" tIns="52922" rIns="52922" rtlCol="0" anchor="ctr"/>
+          <a:lstStyle/>
+          <a:p>
+            <a:pPr algn="ctr" defTabSz="672130"/>
+            <a:endParaRPr lang="en-US" sz="1176" dirty="0">
+              <a:solidFill>
+                <a:prstClr val="black"/>
+              </a:solidFill>
+              <a:latin typeface="Simplon BP Regular"/>
+              <a:cs typeface="Simplon BP Regular"/>
+            </a:endParaRPr>
+          </a:p>
+        </p:txBody>
+      </p:sp>
+      <p:sp>
+        <p:nvSpPr>
+          <p:cNvPr id="86" name="TextBox 138"/>
+          <p:cNvSpPr txBox="1"/>
+          <p:nvPr/>
+        </p:nvSpPr>
+        <p:spPr>
+          <a:xfrm>
+            <a:off x="8126053" y="576471"/>
+            <a:ext cx="899678" cy="179824"/>
+          </a:xfrm>
+          <a:prstGeom prst="rect">
+            <a:avLst/>
+          </a:prstGeom>
+          <a:noFill/>
+          <a:ln w="12700">
+            <a:noFill/>
+          </a:ln>
+        </p:spPr>
+        <p:style>
+          <a:lnRef idx="2">
+            <a:schemeClr val="accent4"/>
+          </a:lnRef>
+          <a:fillRef idx="1">
+            <a:schemeClr val="lt1"/>
+          </a:fillRef>
+          <a:effectRef idx="0">
+            <a:schemeClr val="accent4"/>
+          </a:effectRef>
+          <a:fontRef idx="minor">
+            <a:schemeClr val="dk1"/>
+          </a:fontRef>
+        </p:style>
+        <p:txBody>
+          <a:bodyPr wrap="none" lIns="52922" tIns="52922" rIns="52922" bIns="0" rtlCol="0" anchor="b"/>
+          <a:lstStyle>
+            <a:defPPr>
+              <a:defRPr lang="en-US"/>
+            </a:defPPr>
+            <a:lvl1pPr algn="ctr">
+              <a:defRPr sz="1000" b="1">
+                <a:latin typeface="Simplon BP Regular"/>
+                <a:cs typeface="Simplon BP Regular"/>
+              </a:defRPr>
+            </a:lvl1pPr>
+            <a:lvl2pPr>
+              <a:defRPr>
+                <a:solidFill>
+                  <a:schemeClr val="dk1"/>
+                </a:solidFill>
+              </a:defRPr>
+            </a:lvl2pPr>
+            <a:lvl3pPr>
+              <a:defRPr>
+                <a:solidFill>
+                  <a:schemeClr val="dk1"/>
+                </a:solidFill>
+              </a:defRPr>
+            </a:lvl3pPr>
+            <a:lvl4pPr>
+              <a:defRPr>
+                <a:solidFill>
+                  <a:schemeClr val="dk1"/>
+                </a:solidFill>
+              </a:defRPr>
+            </a:lvl4pPr>
+            <a:lvl5pPr>
+              <a:defRPr>
+                <a:solidFill>
+                  <a:schemeClr val="dk1"/>
+                </a:solidFill>
+              </a:defRPr>
+            </a:lvl5pPr>
+            <a:lvl6pPr>
+              <a:defRPr>
+                <a:solidFill>
+                  <a:schemeClr val="dk1"/>
+                </a:solidFill>
+              </a:defRPr>
+            </a:lvl6pPr>
+            <a:lvl7pPr>
+              <a:defRPr>
+                <a:solidFill>
+                  <a:schemeClr val="dk1"/>
+                </a:solidFill>
+              </a:defRPr>
+            </a:lvl7pPr>
+            <a:lvl8pPr>
+              <a:defRPr>
+                <a:solidFill>
+                  <a:schemeClr val="dk1"/>
+                </a:solidFill>
+              </a:defRPr>
+            </a:lvl8pPr>
+            <a:lvl9pPr>
+              <a:defRPr>
+                <a:solidFill>
+                  <a:schemeClr val="dk1"/>
+                </a:solidFill>
+              </a:defRPr>
+            </a:lvl9pPr>
+          </a:lstStyle>
+          <a:p>
+            <a:pPr defTabSz="672130"/>
+            <a:r>
+              <a:rPr lang="en-US" sz="1176" b="0" dirty="0" err="1">
+                <a:solidFill>
+                  <a:prstClr val="black"/>
+                </a:solidFill>
+                <a:latin typeface="Simplon BP Bold" pitchFamily="2" charset="0"/>
+              </a:rPr>
+              <a:t>Equipe</a:t>
+            </a:r>
+            <a:endParaRPr lang="en-US" sz="1176" b="0" dirty="0">
+              <a:solidFill>
+                <a:prstClr val="black"/>
+              </a:solidFill>
+              <a:latin typeface="Simplon BP Bold" pitchFamily="2" charset="0"/>
+            </a:endParaRPr>
+          </a:p>
+        </p:txBody>
+      </p:sp>
+      <p:sp>
+        <p:nvSpPr>
+          <p:cNvPr id="64" name="Retângulo 63"/>
+          <p:cNvSpPr/>
+          <p:nvPr/>
+        </p:nvSpPr>
+        <p:spPr>
+          <a:xfrm>
+            <a:off x="512766" y="868345"/>
+            <a:ext cx="6186608" cy="238150"/>
+          </a:xfrm>
+          <a:prstGeom prst="rect">
+            <a:avLst/>
+          </a:prstGeom>
+          <a:solidFill>
+            <a:schemeClr val="bg1">
+              <a:lumMod val="85000"/>
+            </a:schemeClr>
+          </a:solidFill>
+        </p:spPr>
+        <p:txBody>
+          <a:bodyPr vert="horz" lIns="134422" tIns="67211" rIns="134422" bIns="67211" rtlCol="0" anchor="ctr"/>
+          <a:lstStyle/>
+          <a:p>
+            <a:pPr defTabSz="672130"/>
+            <a:r>
+              <a:rPr lang="en-US" sz="1544" dirty="0">
+                <a:latin typeface="Simplon Oi Headline" charset="0"/>
+                <a:ea typeface="Simplon Oi Headline" charset="0"/>
+                <a:cs typeface="Simplon Oi Headline" charset="0"/>
+              </a:rPr>
+              <a:t>PROGRESSOS</a:t>
+            </a:r>
+            <a:endParaRPr lang="pt-BR" sz="1544" dirty="0">
+              <a:latin typeface="Simplon Oi Headline" charset="0"/>
+              <a:ea typeface="Simplon Oi Headline" charset="0"/>
+              <a:cs typeface="Simplon Oi Headline" charset="0"/>
+            </a:endParaRPr>
+          </a:p>
+        </p:txBody>
+      </p:sp>
+      <p:sp>
+        <p:nvSpPr>
+          <p:cNvPr id="65" name="Retângulo 64"/>
+          <p:cNvSpPr/>
+          <p:nvPr/>
+        </p:nvSpPr>
+        <p:spPr>
+          <a:xfrm>
+            <a:off x="6814576" y="868345"/>
+            <a:ext cx="6194715" cy="238150"/>
+          </a:xfrm>
+          <a:prstGeom prst="rect">
+            <a:avLst/>
+          </a:prstGeom>
+          <a:solidFill>
+            <a:schemeClr val="bg1">
+              <a:lumMod val="85000"/>
+            </a:schemeClr>
+          </a:solidFill>
+        </p:spPr>
+        <p:txBody>
+          <a:bodyPr vert="horz" lIns="134422" tIns="67211" rIns="134422" bIns="67211" rtlCol="0" anchor="ctr"/>
+          <a:lstStyle/>
+          <a:p>
+            <a:pPr defTabSz="672130"/>
+            <a:r>
+              <a:rPr lang="pt-BR" sz="1544" dirty="0">
+                <a:latin typeface="Simplon Oi Headline" charset="0"/>
+                <a:ea typeface="Simplon Oi Headline" charset="0"/>
+                <a:cs typeface="Simplon Oi Headline" charset="0"/>
+              </a:rPr>
+              <a:t>Pontos atenção/ Principais Riscos</a:t>
+            </a:r>
+          </a:p>
+        </p:txBody>
+      </p:sp>
+      <p:sp>
+        <p:nvSpPr>
+          <p:cNvPr id="66" name="Retângulo 65"/>
+          <p:cNvSpPr/>
+          <p:nvPr/>
+        </p:nvSpPr>
+        <p:spPr>
+          <a:xfrm>
+            <a:off x="507536" y="3418875"/>
+            <a:ext cx="12505521" cy="238150"/>
+          </a:xfrm>
+          <a:prstGeom prst="rect">
+            <a:avLst/>
+          </a:prstGeom>
+          <a:solidFill>
+            <a:schemeClr val="bg1">
+              <a:lumMod val="85000"/>
+            </a:schemeClr>
+          </a:solidFill>
+        </p:spPr>
+        <p:txBody>
+          <a:bodyPr vert="horz" lIns="134422" tIns="67211" rIns="134422" bIns="67211" rtlCol="0" anchor="ctr"/>
+          <a:lstStyle/>
+          <a:p>
+            <a:pPr defTabSz="672130"/>
+            <a:r>
+              <a:rPr lang="pt-BR" sz="1544" dirty="0">
+                <a:latin typeface="Simplon Oi Headline" charset="0"/>
+                <a:ea typeface="Simplon Oi Headline" charset="0"/>
+                <a:cs typeface="Simplon Oi Headline" charset="0"/>
+              </a:rPr>
+              <a:t>Próximos Passos/ Decisões a tomar</a:t>
+            </a:r>
+          </a:p>
+        </p:txBody>
+      </p:sp>
+      <p:sp>
+        <p:nvSpPr>
+          <p:cNvPr id="63" name="Rectangle 37"/>
+          <p:cNvSpPr/>
+          <p:nvPr/>
+        </p:nvSpPr>
+        <p:spPr>
+          <a:xfrm>
+            <a:off x="496765" y="1106495"/>
+            <a:ext cx="6207777" cy="2235805"/>
+          </a:xfrm>
+          <a:prstGeom prst="rect">
+            <a:avLst/>
+          </a:prstGeom>
+          <a:noFill/>
+          <a:ln w="12700">
+            <a:solidFill>
+              <a:schemeClr val="bg1">
+                <a:lumMod val="50000"/>
+              </a:schemeClr>
+            </a:solidFill>
+          </a:ln>
+        </p:spPr>
+        <p:style>
+          <a:lnRef idx="2">
+            <a:schemeClr val="accent4"/>
+          </a:lnRef>
+          <a:fillRef idx="1">
+            <a:schemeClr val="lt1"/>
+          </a:fillRef>
+          <a:effectRef idx="0">
+            <a:schemeClr val="accent4"/>
+          </a:effectRef>
+          <a:fontRef idx="minor">
+            <a:schemeClr val="dk1"/>
+          </a:fontRef>
+        </p:style>
+        <p:txBody>
+          <a:bodyPr tIns="105844" rtlCol="0" anchor="t"/>
+          <a:lstStyle/>
+          <a:p>
+            <a:pPr marL="252049" lvl="1" indent="-252049">
+              <a:buFont typeface="Wingdings" panose="05000000000000000000" pitchFamily="2" charset="2"/>
+              <a:buChar char="§"/>
+            </a:pPr>
+            <a:r>
+              <a:rPr lang="pt-BR" sz="1323" b="1" dirty="0">
+                <a:solidFill>
+                  <a:schemeClr val="tx1"/>
+                </a:solidFill>
+                <a:latin typeface="Calibri" panose="020F0502020204030204" pitchFamily="34" charset="0"/>
+                <a:cs typeface="Simplon BP Regular"/>
+              </a:rPr>
+              <a:t>Criação da identidade visual (logo, paleta de cores)</a:t>
+            </a:r>
+          </a:p>
+          <a:p>
+            <a:pPr marL="252049" lvl="1" indent="-252049">
+              <a:buFont typeface="Wingdings" panose="05000000000000000000" pitchFamily="2" charset="2"/>
+              <a:buChar char="§"/>
+            </a:pPr>
+            <a:r>
+              <a:rPr lang="pt-BR" sz="1320" b="1" dirty="0">
+                <a:solidFill>
+                  <a:schemeClr val="tx1"/>
+                </a:solidFill>
+                <a:latin typeface="Calibri" panose="020F0502020204030204" pitchFamily="34" charset="0"/>
+                <a:cs typeface="Simplon BP Regular"/>
+              </a:rPr>
+              <a:t>Conclusão do mapa de empatia;</a:t>
+            </a:r>
+          </a:p>
+          <a:p>
+            <a:pPr marL="252049" lvl="1" indent="-252049">
+              <a:buFont typeface="Wingdings" panose="05000000000000000000" pitchFamily="2" charset="2"/>
+              <a:buChar char="§"/>
+            </a:pPr>
+            <a:r>
+              <a:rPr lang="pt-BR" sz="1320" b="1" dirty="0">
+                <a:solidFill>
+                  <a:schemeClr val="tx1"/>
+                </a:solidFill>
+                <a:latin typeface="Calibri" panose="020F0502020204030204" pitchFamily="34" charset="0"/>
+                <a:cs typeface="Simplon BP Regular"/>
+              </a:rPr>
+              <a:t>Validação da </a:t>
+            </a:r>
+            <a:r>
+              <a:rPr lang="pt-BR" sz="1320" b="1" dirty="0" err="1">
+                <a:solidFill>
+                  <a:schemeClr val="tx1"/>
+                </a:solidFill>
+                <a:latin typeface="Calibri" panose="020F0502020204030204" pitchFamily="34" charset="0"/>
+                <a:cs typeface="Simplon BP Regular"/>
+              </a:rPr>
+              <a:t>proto</a:t>
+            </a:r>
+            <a:r>
+              <a:rPr lang="pt-BR" sz="1320" b="1" dirty="0">
+                <a:solidFill>
+                  <a:schemeClr val="tx1"/>
+                </a:solidFill>
+                <a:latin typeface="Calibri" panose="020F0502020204030204" pitchFamily="34" charset="0"/>
+                <a:cs typeface="Simplon BP Regular"/>
+              </a:rPr>
+              <a:t> persona;</a:t>
+            </a:r>
+          </a:p>
+          <a:p>
+            <a:pPr marL="252049" lvl="1" indent="-252049">
+              <a:buFont typeface="Wingdings" panose="05000000000000000000" pitchFamily="2" charset="2"/>
+              <a:buChar char="§"/>
+            </a:pPr>
+            <a:r>
+              <a:rPr lang="pt-BR" sz="1320" b="1" dirty="0">
+                <a:solidFill>
+                  <a:schemeClr val="tx1"/>
+                </a:solidFill>
+                <a:latin typeface="Calibri" panose="020F0502020204030204" pitchFamily="34" charset="0"/>
+                <a:cs typeface="Simplon BP Regular"/>
+              </a:rPr>
+              <a:t>Definir agenda semanal da equipe</a:t>
+            </a:r>
+          </a:p>
+          <a:p>
+            <a:pPr marL="252049" lvl="1" indent="-252049">
+              <a:buFont typeface="Wingdings" panose="05000000000000000000" pitchFamily="2" charset="2"/>
+              <a:buChar char="§"/>
+            </a:pPr>
+            <a:r>
+              <a:rPr lang="pt-BR" sz="1320" b="1" dirty="0">
+                <a:solidFill>
+                  <a:schemeClr val="tx1"/>
+                </a:solidFill>
+                <a:latin typeface="Calibri" panose="020F0502020204030204" pitchFamily="34" charset="0"/>
+                <a:cs typeface="Simplon BP Regular"/>
+              </a:rPr>
+              <a:t>Por em prática as entrevistas para o mapa de empatia</a:t>
+            </a:r>
+          </a:p>
+          <a:p>
+            <a:pPr marL="252049" lvl="1" indent="-252049">
+              <a:buFont typeface="Wingdings" panose="05000000000000000000" pitchFamily="2" charset="2"/>
+              <a:buChar char="§"/>
+            </a:pPr>
+            <a:r>
+              <a:rPr lang="pt-BR" sz="1320" b="1" dirty="0">
+                <a:solidFill>
+                  <a:schemeClr val="tx1"/>
+                </a:solidFill>
+                <a:latin typeface="Calibri" panose="020F0502020204030204" pitchFamily="34" charset="0"/>
+                <a:cs typeface="Simplon BP Regular"/>
+              </a:rPr>
+              <a:t>Criamos </a:t>
+            </a:r>
+            <a:r>
+              <a:rPr lang="pt-BR" sz="1320" b="1" dirty="0" err="1">
+                <a:solidFill>
+                  <a:schemeClr val="tx1"/>
+                </a:solidFill>
+                <a:latin typeface="Calibri" panose="020F0502020204030204" pitchFamily="34" charset="0"/>
+                <a:cs typeface="Simplon BP Regular"/>
+              </a:rPr>
+              <a:t>Wireframe</a:t>
+            </a:r>
+            <a:r>
+              <a:rPr lang="pt-BR" sz="1320" b="1" dirty="0">
+                <a:solidFill>
+                  <a:schemeClr val="tx1"/>
+                </a:solidFill>
+                <a:latin typeface="Calibri" panose="020F0502020204030204" pitchFamily="34" charset="0"/>
+                <a:cs typeface="Simplon BP Regular"/>
+              </a:rPr>
+              <a:t> do site institucional</a:t>
+            </a:r>
+          </a:p>
+          <a:p>
+            <a:pPr marL="252049" lvl="1" indent="-252049">
+              <a:buFont typeface="Wingdings" panose="05000000000000000000" pitchFamily="2" charset="2"/>
+              <a:buChar char="§"/>
+            </a:pPr>
+            <a:r>
+              <a:rPr lang="pt-BR" sz="1320" b="1" dirty="0">
+                <a:solidFill>
+                  <a:schemeClr val="tx1"/>
+                </a:solidFill>
+                <a:latin typeface="Calibri" panose="020F0502020204030204" pitchFamily="34" charset="0"/>
+                <a:cs typeface="Simplon BP Regular"/>
+              </a:rPr>
+              <a:t>Começamos a idealizar </a:t>
+            </a:r>
+            <a:r>
+              <a:rPr lang="pt-BR" sz="1320" b="1" dirty="0" err="1">
+                <a:solidFill>
+                  <a:schemeClr val="tx1"/>
+                </a:solidFill>
+                <a:latin typeface="Calibri" panose="020F0502020204030204" pitchFamily="34" charset="0"/>
+                <a:cs typeface="Simplon BP Regular"/>
+              </a:rPr>
+              <a:t>wireframe</a:t>
+            </a:r>
+            <a:r>
+              <a:rPr lang="pt-BR" sz="1320" b="1" dirty="0">
+                <a:solidFill>
+                  <a:schemeClr val="tx1"/>
+                </a:solidFill>
+                <a:latin typeface="Calibri" panose="020F0502020204030204" pitchFamily="34" charset="0"/>
+                <a:cs typeface="Simplon BP Regular"/>
+              </a:rPr>
+              <a:t> do portal web com as funcionalidade do projeto</a:t>
+            </a:r>
+          </a:p>
+          <a:p>
+            <a:pPr marL="252049" lvl="1" indent="-252049">
+              <a:buFont typeface="Wingdings" panose="05000000000000000000" pitchFamily="2" charset="2"/>
+              <a:buChar char="§"/>
+            </a:pPr>
+            <a:r>
+              <a:rPr lang="pt-BR" sz="1320" b="1" dirty="0">
+                <a:solidFill>
+                  <a:schemeClr val="tx1"/>
+                </a:solidFill>
+                <a:latin typeface="Calibri" panose="020F0502020204030204" pitchFamily="34" charset="0"/>
+                <a:cs typeface="Simplon BP Regular"/>
+              </a:rPr>
+              <a:t>Primeira desenho do MER</a:t>
+            </a:r>
+          </a:p>
+          <a:p>
+            <a:pPr marL="252049" lvl="1" indent="-252049">
+              <a:buFont typeface="Wingdings" panose="05000000000000000000" pitchFamily="2" charset="2"/>
+              <a:buChar char="§"/>
+            </a:pPr>
+            <a:r>
+              <a:rPr lang="pt-BR" sz="1320" b="1" dirty="0">
+                <a:solidFill>
+                  <a:schemeClr val="tx1"/>
+                </a:solidFill>
+                <a:latin typeface="Calibri" panose="020F0502020204030204" pitchFamily="34" charset="0"/>
+                <a:cs typeface="Simplon BP Regular"/>
+              </a:rPr>
+              <a:t>Primeira versão da Jornada de usuário </a:t>
+            </a:r>
+          </a:p>
+          <a:p>
+            <a:pPr marL="0" lvl="1"/>
+            <a:endParaRPr lang="pt-BR" sz="1200" dirty="0">
+              <a:solidFill>
+                <a:schemeClr val="tx1"/>
+              </a:solidFill>
+              <a:latin typeface="Calibri" panose="020F0502020204030204" pitchFamily="34" charset="0"/>
+              <a:cs typeface="Simplon BP Regular"/>
+            </a:endParaRPr>
+          </a:p>
+          <a:p>
+            <a:pPr marL="252049" lvl="1" indent="-252049">
+              <a:buFont typeface="Wingdings" panose="05000000000000000000" pitchFamily="2" charset="2"/>
+              <a:buChar char="§"/>
+            </a:pPr>
+            <a:endParaRPr lang="pt-BR" sz="1200" dirty="0">
+              <a:solidFill>
+                <a:schemeClr val="tx1"/>
+              </a:solidFill>
+              <a:latin typeface="Calibri" panose="020F0502020204030204" pitchFamily="34" charset="0"/>
+              <a:cs typeface="Simplon BP Regular"/>
+            </a:endParaRPr>
+          </a:p>
+          <a:p>
+            <a:pPr marL="252049" lvl="1" indent="-252049">
+              <a:buFont typeface="Wingdings" panose="05000000000000000000" pitchFamily="2" charset="2"/>
+              <a:buChar char="§"/>
+            </a:pPr>
+            <a:endParaRPr lang="pt-BR" sz="1323" b="1" dirty="0">
+              <a:solidFill>
+                <a:schemeClr val="tx1"/>
+              </a:solidFill>
+              <a:latin typeface="Calibri" panose="020F0502020204030204" pitchFamily="34" charset="0"/>
+              <a:cs typeface="Simplon BP Regular"/>
+            </a:endParaRPr>
+          </a:p>
+          <a:p>
+            <a:pPr marL="0" lvl="1" defTabSz="672130"/>
+            <a:endParaRPr lang="pt-BR" sz="1600" b="1" dirty="0">
+              <a:solidFill>
+                <a:schemeClr val="tx1"/>
+              </a:solidFill>
+              <a:latin typeface="Calibri" panose="020F0502020204030204" pitchFamily="34" charset="0"/>
+              <a:cs typeface="Simplon BP Regular"/>
+            </a:endParaRPr>
+          </a:p>
+          <a:p>
+            <a:pPr marL="252049" lvl="1" indent="-252049" fontAlgn="base">
+              <a:spcBef>
+                <a:spcPct val="0"/>
+              </a:spcBef>
+              <a:buFont typeface="Wingdings" panose="05000000000000000000" pitchFamily="2" charset="2"/>
+              <a:buChar char="ü"/>
+              <a:defRPr/>
+            </a:pPr>
+            <a:endParaRPr lang="pt-BR" sz="1323" b="1" dirty="0">
+              <a:solidFill>
+                <a:schemeClr val="tx1"/>
+              </a:solidFill>
+              <a:latin typeface="Calibri" panose="020F0502020204030204" pitchFamily="34" charset="0"/>
+              <a:cs typeface="Simplon BP Regular"/>
+            </a:endParaRPr>
+          </a:p>
+          <a:p>
+            <a:pPr marL="252049" lvl="1" indent="-252049" fontAlgn="base">
+              <a:spcBef>
+                <a:spcPct val="0"/>
+              </a:spcBef>
+              <a:buFont typeface="Wingdings" panose="05000000000000000000" pitchFamily="2" charset="2"/>
+              <a:buChar char="ü"/>
+              <a:defRPr/>
+            </a:pPr>
+            <a:endParaRPr lang="pt-BR" sz="1323" b="1" dirty="0">
+              <a:solidFill>
+                <a:schemeClr val="tx1"/>
+              </a:solidFill>
+              <a:latin typeface="Calibri" panose="020F0502020204030204" pitchFamily="34" charset="0"/>
+              <a:cs typeface="Simplon BP Regular"/>
+            </a:endParaRPr>
+          </a:p>
+          <a:p>
+            <a:pPr marL="252049" lvl="1" indent="-252049" fontAlgn="base">
+              <a:spcBef>
+                <a:spcPct val="0"/>
+              </a:spcBef>
+              <a:buFont typeface="Wingdings" panose="05000000000000000000" pitchFamily="2" charset="2"/>
+              <a:buChar char="ü"/>
+              <a:defRPr/>
+            </a:pPr>
+            <a:endParaRPr lang="pt-BR" sz="1323" b="1" dirty="0">
+              <a:solidFill>
+                <a:schemeClr val="tx1"/>
+              </a:solidFill>
+              <a:latin typeface="Calibri" panose="020F0502020204030204" pitchFamily="34" charset="0"/>
+              <a:cs typeface="Simplon BP Regular"/>
+            </a:endParaRPr>
+          </a:p>
+          <a:p>
+            <a:pPr marL="252049" indent="-252049" fontAlgn="base">
+              <a:spcBef>
+                <a:spcPct val="0"/>
+              </a:spcBef>
+              <a:buFont typeface="Wingdings" panose="05000000000000000000" pitchFamily="2" charset="2"/>
+              <a:buChar char="ü"/>
+              <a:defRPr/>
+            </a:pPr>
+            <a:endParaRPr lang="pt-BR" sz="1323" b="1" dirty="0">
+              <a:solidFill>
+                <a:schemeClr val="tx1"/>
+              </a:solidFill>
+              <a:latin typeface="Calibri" panose="020F0502020204030204" pitchFamily="34" charset="0"/>
+              <a:cs typeface="Simplon BP Regular"/>
+            </a:endParaRPr>
+          </a:p>
+          <a:p>
+            <a:pPr marL="252049" indent="-252049" fontAlgn="base">
+              <a:spcBef>
+                <a:spcPct val="0"/>
+              </a:spcBef>
+              <a:buFont typeface="Wingdings" panose="05000000000000000000" pitchFamily="2" charset="2"/>
+              <a:buChar char="ü"/>
+              <a:defRPr/>
+            </a:pPr>
+            <a:endParaRPr lang="pt-BR" sz="1323" b="1" dirty="0">
+              <a:solidFill>
+                <a:schemeClr val="tx1"/>
+              </a:solidFill>
+              <a:latin typeface="Calibri" panose="020F0502020204030204" pitchFamily="34" charset="0"/>
+              <a:cs typeface="Simplon BP Regular"/>
+            </a:endParaRPr>
+          </a:p>
+        </p:txBody>
+      </p:sp>
+      <p:sp>
+        <p:nvSpPr>
+          <p:cNvPr id="4" name="Retângulo 3"/>
+          <p:cNvSpPr/>
+          <p:nvPr/>
+        </p:nvSpPr>
+        <p:spPr>
+          <a:xfrm>
+            <a:off x="6844996" y="1121895"/>
+            <a:ext cx="6164295" cy="703078"/>
+          </a:xfrm>
+          <a:prstGeom prst="rect">
+            <a:avLst/>
+          </a:prstGeom>
+        </p:spPr>
+        <p:txBody>
+          <a:bodyPr wrap="square">
+            <a:spAutoFit/>
+          </a:bodyPr>
+          <a:lstStyle/>
+          <a:p>
+            <a:pPr marL="252049" indent="-252049" fontAlgn="base">
+              <a:spcBef>
+                <a:spcPct val="0"/>
+              </a:spcBef>
+              <a:buFont typeface="Wingdings" panose="05000000000000000000" pitchFamily="2" charset="2"/>
+              <a:buChar char="§"/>
+              <a:defRPr/>
+            </a:pPr>
+            <a:r>
+              <a:rPr lang="pt-BR" sz="1323" b="1" dirty="0">
+                <a:latin typeface="Calibri" panose="020F0502020204030204" pitchFamily="34" charset="0"/>
+                <a:cs typeface="Simplon BP Regular"/>
+              </a:rPr>
+              <a:t>Aguardando resposta da administradora da Biblioteca</a:t>
+            </a:r>
+          </a:p>
+          <a:p>
+            <a:pPr marL="252049" indent="-252049" fontAlgn="base">
+              <a:spcBef>
+                <a:spcPct val="0"/>
+              </a:spcBef>
+              <a:buFont typeface="Wingdings" panose="05000000000000000000" pitchFamily="2" charset="2"/>
+              <a:buChar char="§"/>
+              <a:defRPr/>
+            </a:pPr>
+            <a:r>
+              <a:rPr lang="pt-BR" sz="1323" b="1" dirty="0">
+                <a:latin typeface="Calibri" panose="020F0502020204030204" pitchFamily="34" charset="0"/>
+                <a:cs typeface="Simplon BP Regular"/>
+              </a:rPr>
+              <a:t>Iniciar entregável de Estrutura de dados</a:t>
+            </a:r>
+          </a:p>
+          <a:p>
+            <a:pPr marL="252049" indent="-252049" fontAlgn="base">
+              <a:spcBef>
+                <a:spcPct val="0"/>
+              </a:spcBef>
+              <a:buFont typeface="Wingdings" panose="05000000000000000000" pitchFamily="2" charset="2"/>
+              <a:buChar char="§"/>
+              <a:defRPr/>
+            </a:pPr>
+            <a:endParaRPr lang="pt-BR" sz="1323" b="1" dirty="0">
+              <a:latin typeface="Calibri" panose="020F0502020204030204" pitchFamily="34" charset="0"/>
+              <a:cs typeface="Simplon BP Regular"/>
+            </a:endParaRPr>
+          </a:p>
+        </p:txBody>
+      </p:sp>
+      <p:sp>
+        <p:nvSpPr>
+          <p:cNvPr id="2" name="Rectangle 43">
+            <a:extLst>
+              <a:ext uri="{FF2B5EF4-FFF2-40B4-BE49-F238E27FC236}">
+                <a16:creationId xmlns:a16="http://schemas.microsoft.com/office/drawing/2014/main" id="{B15BA19F-C787-4E6A-ADAB-C0DFF09C66A8}"/>
+              </a:ext>
+            </a:extLst>
+          </p:cNvPr>
+          <p:cNvSpPr>
+            <a:spLocks/>
+          </p:cNvSpPr>
+          <p:nvPr/>
+        </p:nvSpPr>
+        <p:spPr>
+          <a:xfrm>
+            <a:off x="512766" y="3728204"/>
+            <a:ext cx="12496524" cy="3581485"/>
+          </a:xfrm>
+          <a:prstGeom prst="rect">
+            <a:avLst/>
+          </a:prstGeom>
+          <a:noFill/>
+          <a:ln w="12700">
+            <a:solidFill>
+              <a:schemeClr val="bg1">
+                <a:lumMod val="50000"/>
+              </a:schemeClr>
+            </a:solidFill>
+          </a:ln>
+        </p:spPr>
+        <p:style>
+          <a:lnRef idx="2">
+            <a:schemeClr val="accent4"/>
+          </a:lnRef>
+          <a:fillRef idx="1">
+            <a:schemeClr val="lt1"/>
+          </a:fillRef>
+          <a:effectRef idx="0">
+            <a:schemeClr val="accent4"/>
+          </a:effectRef>
+          <a:fontRef idx="minor">
+            <a:schemeClr val="dk1"/>
+          </a:fontRef>
+        </p:style>
+        <p:txBody>
+          <a:bodyPr wrap="square" tIns="105844" numCol="3" rtlCol="0" anchor="ctr"/>
+          <a:lstStyle/>
+          <a:p>
+            <a:pPr marL="0" lvl="1" defTabSz="672130"/>
+            <a:r>
+              <a:rPr lang="pt-BR" sz="1323" b="1" dirty="0">
+                <a:solidFill>
+                  <a:schemeClr val="tx1"/>
+                </a:solidFill>
+                <a:latin typeface="Calibri" panose="020F0502020204030204" pitchFamily="34" charset="0"/>
+                <a:cs typeface="Simplon BP Regular"/>
+              </a:rPr>
+              <a:t>Frente Plataforma</a:t>
+            </a:r>
+          </a:p>
+          <a:p>
+            <a:pPr marL="0" lvl="1" defTabSz="672130"/>
+            <a:endParaRPr lang="pt-BR" sz="1323" b="1" dirty="0">
+              <a:solidFill>
+                <a:schemeClr val="tx1"/>
+              </a:solidFill>
+              <a:latin typeface="Calibri" panose="020F0502020204030204" pitchFamily="34" charset="0"/>
+              <a:cs typeface="Simplon BP Regular"/>
+            </a:endParaRPr>
+          </a:p>
+          <a:p>
+            <a:pPr marL="0" lvl="1" defTabSz="672130"/>
+            <a:r>
+              <a:rPr lang="pt-BR" sz="1323" b="1" dirty="0">
+                <a:solidFill>
+                  <a:schemeClr val="tx1"/>
+                </a:solidFill>
+                <a:latin typeface="Calibri" panose="020F0502020204030204" pitchFamily="34" charset="0"/>
+                <a:cs typeface="Simplon BP Regular"/>
+              </a:rPr>
+              <a:t>Frente </a:t>
+            </a:r>
+            <a:r>
+              <a:rPr lang="pt-BR" sz="1323" b="1" dirty="0" err="1">
+                <a:solidFill>
+                  <a:schemeClr val="tx1"/>
+                </a:solidFill>
+                <a:latin typeface="Calibri" panose="020F0502020204030204" pitchFamily="34" charset="0"/>
+                <a:cs typeface="Simplon BP Regular"/>
+              </a:rPr>
+              <a:t>Backend</a:t>
+            </a:r>
+            <a:endParaRPr lang="pt-BR" sz="1323" b="1" dirty="0">
+              <a:solidFill>
+                <a:schemeClr val="tx1"/>
+              </a:solidFill>
+              <a:latin typeface="Calibri" panose="020F0502020204030204" pitchFamily="34" charset="0"/>
+              <a:cs typeface="Simplon BP Regular"/>
+            </a:endParaRPr>
+          </a:p>
+          <a:p>
+            <a:pPr marL="0" lvl="1" defTabSz="672130"/>
+            <a:endParaRPr lang="pt-BR" sz="1323" b="1" dirty="0">
+              <a:solidFill>
+                <a:schemeClr val="tx1"/>
+              </a:solidFill>
+              <a:latin typeface="Calibri" panose="020F0502020204030204" pitchFamily="34" charset="0"/>
+              <a:cs typeface="Simplon BP Regular"/>
+            </a:endParaRPr>
+          </a:p>
+          <a:p>
+            <a:pPr marL="285750" lvl="1" indent="-285750" defTabSz="672130">
+              <a:buFont typeface="Wingdings" panose="05000000000000000000" pitchFamily="2" charset="2"/>
+              <a:buChar char="§"/>
+            </a:pPr>
+            <a:r>
+              <a:rPr lang="pt-BR" sz="1323" dirty="0">
+                <a:solidFill>
+                  <a:schemeClr val="tx1"/>
+                </a:solidFill>
+                <a:latin typeface="Calibri" panose="020F0502020204030204" pitchFamily="34" charset="0"/>
+                <a:cs typeface="Simplon BP Regular"/>
+              </a:rPr>
+              <a:t>Criar Modelo Spring do projeto;</a:t>
+            </a:r>
+          </a:p>
+          <a:p>
+            <a:pPr marL="0" lvl="1" defTabSz="672130"/>
+            <a:endParaRPr lang="pt-BR" sz="1323" b="1" dirty="0">
+              <a:solidFill>
+                <a:schemeClr val="tx1"/>
+              </a:solidFill>
+              <a:latin typeface="Calibri" panose="020F0502020204030204" pitchFamily="34" charset="0"/>
+              <a:cs typeface="Simplon BP Regular"/>
+            </a:endParaRPr>
+          </a:p>
+          <a:p>
+            <a:pPr marL="0" lvl="1" defTabSz="672130"/>
+            <a:r>
+              <a:rPr lang="pt-BR" sz="1323" b="1" dirty="0">
+                <a:solidFill>
+                  <a:schemeClr val="tx1"/>
+                </a:solidFill>
+                <a:latin typeface="Calibri" panose="020F0502020204030204" pitchFamily="34" charset="0"/>
+                <a:cs typeface="Simplon BP Regular"/>
+              </a:rPr>
+              <a:t>Frente Front </a:t>
+            </a:r>
+            <a:r>
+              <a:rPr lang="pt-BR" sz="1323" b="1" dirty="0" err="1">
+                <a:solidFill>
+                  <a:schemeClr val="tx1"/>
+                </a:solidFill>
+                <a:latin typeface="Calibri" panose="020F0502020204030204" pitchFamily="34" charset="0"/>
+                <a:cs typeface="Simplon BP Regular"/>
+              </a:rPr>
+              <a:t>end</a:t>
+            </a:r>
+            <a:endParaRPr lang="pt-BR" sz="1323" b="1" dirty="0">
+              <a:solidFill>
+                <a:schemeClr val="tx1"/>
+              </a:solidFill>
+              <a:latin typeface="Calibri" panose="020F0502020204030204" pitchFamily="34" charset="0"/>
+              <a:cs typeface="Simplon BP Regular"/>
+            </a:endParaRPr>
+          </a:p>
+          <a:p>
+            <a:pPr marL="252049" lvl="1" indent="-252049">
+              <a:buFont typeface="Wingdings" panose="05000000000000000000" pitchFamily="2" charset="2"/>
+              <a:buChar char="§"/>
+            </a:pPr>
+            <a:r>
+              <a:rPr lang="pt-BR" sz="1323" dirty="0">
+                <a:solidFill>
+                  <a:schemeClr val="tx1"/>
+                </a:solidFill>
+                <a:latin typeface="Calibri" panose="020F0502020204030204" pitchFamily="34" charset="0"/>
+                <a:cs typeface="Simplon BP Regular"/>
+              </a:rPr>
+              <a:t>Iniciar protótipo de telas;</a:t>
+            </a:r>
+          </a:p>
+          <a:p>
+            <a:pPr marL="0" lvl="1" defTabSz="672130"/>
+            <a:endParaRPr lang="pt-BR" sz="1600" b="1" dirty="0">
+              <a:solidFill>
+                <a:schemeClr val="tx1"/>
+              </a:solidFill>
+              <a:latin typeface="Calibri" panose="020F0502020204030204" pitchFamily="34" charset="0"/>
+              <a:cs typeface="Simplon BP Regular"/>
+            </a:endParaRPr>
+          </a:p>
+          <a:p>
+            <a:pPr marL="0" lvl="1" defTabSz="672130"/>
+            <a:r>
+              <a:rPr lang="pt-BR" sz="1400" b="1" dirty="0">
+                <a:solidFill>
+                  <a:schemeClr val="tx1"/>
+                </a:solidFill>
+                <a:latin typeface="Calibri" panose="020F0502020204030204" pitchFamily="34" charset="0"/>
+                <a:cs typeface="Simplon BP Regular"/>
+              </a:rPr>
+              <a:t>Frente Negócios</a:t>
+            </a:r>
+            <a:r>
+              <a:rPr lang="pt-BR" sz="1400" dirty="0">
+                <a:solidFill>
+                  <a:schemeClr val="tx1"/>
+                </a:solidFill>
+                <a:latin typeface="Calibri" panose="020F0502020204030204" pitchFamily="34" charset="0"/>
+                <a:cs typeface="Simplon BP Regular"/>
+              </a:rPr>
+              <a:t>;</a:t>
+            </a:r>
+          </a:p>
+          <a:p>
+            <a:pPr marL="252049" lvl="1" indent="-252049">
+              <a:buFont typeface="Wingdings" panose="05000000000000000000" pitchFamily="2" charset="2"/>
+              <a:buChar char="§"/>
+            </a:pPr>
+            <a:r>
+              <a:rPr lang="pt-BR" sz="1400" dirty="0">
+                <a:solidFill>
+                  <a:schemeClr val="tx1"/>
+                </a:solidFill>
+                <a:latin typeface="Calibri" panose="020F0502020204030204" pitchFamily="34" charset="0"/>
+                <a:cs typeface="Simplon BP Regular"/>
+              </a:rPr>
+              <a:t>Definir modelo logico;</a:t>
+            </a:r>
+          </a:p>
+          <a:p>
+            <a:pPr marL="252049" lvl="1" indent="-252049">
+              <a:buFont typeface="Wingdings" panose="05000000000000000000" pitchFamily="2" charset="2"/>
+              <a:buChar char="§"/>
+            </a:pPr>
+            <a:r>
+              <a:rPr lang="pt-BR" sz="1400" dirty="0">
+                <a:solidFill>
+                  <a:schemeClr val="tx1"/>
+                </a:solidFill>
+                <a:latin typeface="Calibri" panose="020F0502020204030204" pitchFamily="34" charset="0"/>
+                <a:cs typeface="Simplon BP Regular"/>
+              </a:rPr>
+              <a:t>Definir regra de negócio;</a:t>
+            </a:r>
+          </a:p>
+          <a:p>
+            <a:pPr marL="0" lvl="1"/>
+            <a:endParaRPr lang="pt-BR" sz="1400" b="1" dirty="0">
+              <a:solidFill>
+                <a:schemeClr val="tx1"/>
+              </a:solidFill>
+              <a:latin typeface="Calibri" panose="020F0502020204030204" pitchFamily="34" charset="0"/>
+              <a:cs typeface="Simplon BP Regular"/>
+            </a:endParaRPr>
+          </a:p>
+          <a:p>
+            <a:pPr marL="0" lvl="1"/>
+            <a:r>
+              <a:rPr lang="pt-BR" sz="1400" b="1" dirty="0">
+                <a:solidFill>
+                  <a:schemeClr val="tx1"/>
+                </a:solidFill>
+                <a:latin typeface="Calibri" panose="020F0502020204030204" pitchFamily="34" charset="0"/>
+                <a:cs typeface="Simplon BP Regular"/>
+              </a:rPr>
+              <a:t>Frente Gestão Organizacional</a:t>
+            </a:r>
+          </a:p>
+          <a:p>
+            <a:pPr marL="285750" lvl="1" indent="-285750">
+              <a:buFont typeface="Wingdings" panose="05000000000000000000" pitchFamily="2" charset="2"/>
+              <a:buChar char="§"/>
+            </a:pPr>
+            <a:r>
+              <a:rPr lang="pt-BR" sz="1400" dirty="0">
+                <a:solidFill>
+                  <a:schemeClr val="tx1"/>
+                </a:solidFill>
+                <a:latin typeface="Calibri" panose="020F0502020204030204" pitchFamily="34" charset="0"/>
+                <a:cs typeface="Simplon BP Regular"/>
+              </a:rPr>
+              <a:t>Por em prática as entrevistas para o mapa de empatia</a:t>
+            </a:r>
+            <a:endParaRPr lang="pt-BR" sz="1600" dirty="0">
+              <a:solidFill>
+                <a:schemeClr val="tx1"/>
+              </a:solidFill>
+              <a:latin typeface="Calibri" panose="020F0502020204030204" pitchFamily="34" charset="0"/>
+              <a:cs typeface="Simplon BP Regular"/>
+            </a:endParaRPr>
+          </a:p>
+        </p:txBody>
+      </p:sp>
+      <p:sp>
+        <p:nvSpPr>
+          <p:cNvPr id="6" name="Oval 134">
+            <a:extLst>
+              <a:ext uri="{FF2B5EF4-FFF2-40B4-BE49-F238E27FC236}">
+                <a16:creationId xmlns:a16="http://schemas.microsoft.com/office/drawing/2014/main" id="{70825C6F-9257-4CF5-8C62-1CA1EB2F8815}"/>
+              </a:ext>
+            </a:extLst>
+          </p:cNvPr>
+          <p:cNvSpPr>
+            <a:spLocks noChangeAspect="1"/>
+          </p:cNvSpPr>
+          <p:nvPr/>
+        </p:nvSpPr>
+        <p:spPr>
+          <a:xfrm>
+            <a:off x="9225955" y="282529"/>
+            <a:ext cx="211404" cy="211689"/>
+          </a:xfrm>
+          <a:prstGeom prst="ellipse">
+            <a:avLst/>
+          </a:prstGeom>
+          <a:solidFill>
+            <a:srgbClr val="00B050"/>
+          </a:solidFill>
+          <a:ln w="12700">
+            <a:solidFill>
+              <a:schemeClr val="accent3"/>
+            </a:solidFill>
+          </a:ln>
+        </p:spPr>
+        <p:style>
+          <a:lnRef idx="2">
+            <a:schemeClr val="accent1">
+              <a:shade val="50000"/>
+            </a:schemeClr>
+          </a:lnRef>
+          <a:fillRef idx="1">
+            <a:schemeClr val="accent1"/>
+          </a:fillRef>
+          <a:effectRef idx="0">
+            <a:schemeClr val="accent1"/>
+          </a:effectRef>
+          <a:fontRef idx="minor">
+            <a:schemeClr val="lt1"/>
+          </a:fontRef>
+        </p:style>
+        <p:txBody>
+          <a:bodyPr wrap="none" lIns="52922" tIns="52922" rIns="52922" rtlCol="0" anchor="ctr"/>
+          <a:lstStyle/>
+          <a:p>
+            <a:pPr algn="ctr" defTabSz="672130"/>
+            <a:endParaRPr lang="en-US" sz="1176" dirty="0">
+              <a:solidFill>
+                <a:prstClr val="black"/>
+              </a:solidFill>
+              <a:latin typeface="Simplon BP Regular"/>
+              <a:cs typeface="Simplon BP Regular"/>
+            </a:endParaRPr>
+          </a:p>
+        </p:txBody>
+      </p:sp>
+      <p:sp>
+        <p:nvSpPr>
+          <p:cNvPr id="9" name="Oval 134">
+            <a:extLst>
+              <a:ext uri="{FF2B5EF4-FFF2-40B4-BE49-F238E27FC236}">
+                <a16:creationId xmlns:a16="http://schemas.microsoft.com/office/drawing/2014/main" id="{B60B13C9-0C70-4C0F-82B2-D0CD4FDFC1F0}"/>
+              </a:ext>
+            </a:extLst>
+          </p:cNvPr>
+          <p:cNvSpPr>
+            <a:spLocks noChangeAspect="1"/>
+          </p:cNvSpPr>
+          <p:nvPr/>
+        </p:nvSpPr>
+        <p:spPr>
+          <a:xfrm>
+            <a:off x="12155999" y="278623"/>
+            <a:ext cx="211404" cy="211689"/>
+          </a:xfrm>
+          <a:prstGeom prst="ellipse">
+            <a:avLst/>
+          </a:prstGeom>
+          <a:solidFill>
+            <a:srgbClr val="00B050"/>
+          </a:solidFill>
+          <a:ln w="12700">
+            <a:solidFill>
+              <a:schemeClr val="accent3"/>
+            </a:solidFill>
+          </a:ln>
+        </p:spPr>
+        <p:style>
+          <a:lnRef idx="2">
+            <a:schemeClr val="accent1">
+              <a:shade val="50000"/>
+            </a:schemeClr>
+          </a:lnRef>
+          <a:fillRef idx="1">
+            <a:schemeClr val="accent1"/>
+          </a:fillRef>
+          <a:effectRef idx="0">
+            <a:schemeClr val="accent1"/>
+          </a:effectRef>
+          <a:fontRef idx="minor">
+            <a:schemeClr val="lt1"/>
+          </a:fontRef>
+        </p:style>
+        <p:txBody>
+          <a:bodyPr wrap="none" lIns="52922" tIns="52922" rIns="52922" rtlCol="0" anchor="ctr"/>
+          <a:lstStyle/>
+          <a:p>
+            <a:pPr algn="ctr" defTabSz="672130"/>
+            <a:endParaRPr lang="en-US" sz="1176" dirty="0">
+              <a:solidFill>
+                <a:prstClr val="black"/>
+              </a:solidFill>
+              <a:latin typeface="Simplon BP Regular"/>
+              <a:cs typeface="Simplon BP Regular"/>
+            </a:endParaRPr>
+          </a:p>
+        </p:txBody>
+      </p:sp>
+      <p:sp>
+        <p:nvSpPr>
+          <p:cNvPr id="44" name="Oval 120">
+            <a:extLst>
+              <a:ext uri="{FF2B5EF4-FFF2-40B4-BE49-F238E27FC236}">
+                <a16:creationId xmlns:a16="http://schemas.microsoft.com/office/drawing/2014/main" id="{2688D066-DD5D-4246-B846-8AD1218C78EC}"/>
+              </a:ext>
+            </a:extLst>
+          </p:cNvPr>
+          <p:cNvSpPr>
+            <a:spLocks noChangeAspect="1"/>
+          </p:cNvSpPr>
+          <p:nvPr/>
+        </p:nvSpPr>
+        <p:spPr>
+          <a:xfrm>
+            <a:off x="10188056" y="288207"/>
+            <a:ext cx="211404" cy="211689"/>
+          </a:xfrm>
+          <a:prstGeom prst="ellipse">
+            <a:avLst/>
+          </a:prstGeom>
+          <a:solidFill>
+            <a:srgbClr val="00B050"/>
+          </a:solidFill>
+          <a:ln w="12700">
+            <a:solidFill>
+              <a:schemeClr val="accent3"/>
+            </a:solidFill>
+          </a:ln>
+        </p:spPr>
+        <p:style>
+          <a:lnRef idx="2">
+            <a:schemeClr val="accent1">
+              <a:shade val="50000"/>
+            </a:schemeClr>
+          </a:lnRef>
+          <a:fillRef idx="1">
+            <a:schemeClr val="accent1"/>
+          </a:fillRef>
+          <a:effectRef idx="0">
+            <a:schemeClr val="accent1"/>
+          </a:effectRef>
+          <a:fontRef idx="minor">
+            <a:schemeClr val="lt1"/>
+          </a:fontRef>
+        </p:style>
+        <p:txBody>
+          <a:bodyPr wrap="none" lIns="52922" tIns="52922" rIns="52922" rtlCol="0" anchor="ctr"/>
+          <a:lstStyle/>
+          <a:p>
+            <a:pPr algn="ctr" defTabSz="672130"/>
+            <a:endParaRPr lang="en-US" sz="1176" dirty="0">
+              <a:solidFill>
+                <a:prstClr val="black"/>
+              </a:solidFill>
+              <a:latin typeface="Simplon BP Regular"/>
+              <a:cs typeface="Simplon BP Regular"/>
+            </a:endParaRPr>
+          </a:p>
+        </p:txBody>
+      </p:sp>
+      <p:sp>
+        <p:nvSpPr>
+          <p:cNvPr id="5" name="Retângulo 4">
+            <a:extLst>
+              <a:ext uri="{FF2B5EF4-FFF2-40B4-BE49-F238E27FC236}">
+                <a16:creationId xmlns:a16="http://schemas.microsoft.com/office/drawing/2014/main" id="{A1C14918-6027-46B3-96BF-C5F7FDEC3276}"/>
+              </a:ext>
+            </a:extLst>
+          </p:cNvPr>
+          <p:cNvSpPr/>
+          <p:nvPr/>
+        </p:nvSpPr>
+        <p:spPr>
+          <a:xfrm>
+            <a:off x="8017619" y="180231"/>
+            <a:ext cx="4937689" cy="618769"/>
+          </a:xfrm>
+          <a:prstGeom prst="rect">
+            <a:avLst/>
+          </a:prstGeom>
+          <a:noFill/>
+          <a:ln w="6350">
+            <a:solidFill>
+              <a:schemeClr val="bg1">
+                <a:lumMod val="75000"/>
+              </a:schemeClr>
+            </a:solidFill>
+          </a:ln>
+        </p:spPr>
+        <p:style>
+          <a:lnRef idx="2">
+            <a:schemeClr val="accent1">
+              <a:shade val="50000"/>
+            </a:schemeClr>
+          </a:lnRef>
+          <a:fillRef idx="1">
+            <a:schemeClr val="accent1"/>
+          </a:fillRef>
+          <a:effectRef idx="0">
+            <a:schemeClr val="accent1"/>
+          </a:effectRef>
+          <a:fontRef idx="minor">
+            <a:schemeClr val="lt1"/>
+          </a:fontRef>
+        </p:style>
+        <p:txBody>
+          <a:bodyPr rtlCol="0" anchor="ctr"/>
+          <a:lstStyle/>
+          <a:p>
+            <a:pPr algn="ctr"/>
+            <a:endParaRPr lang="pt-BR"/>
+          </a:p>
+        </p:txBody>
+      </p:sp>
+      <p:sp>
+        <p:nvSpPr>
+          <p:cNvPr id="8" name="TextBox 138">
+            <a:extLst>
+              <a:ext uri="{FF2B5EF4-FFF2-40B4-BE49-F238E27FC236}">
+                <a16:creationId xmlns:a16="http://schemas.microsoft.com/office/drawing/2014/main" id="{5CE7D08C-795B-4BF1-97F6-F9773F4E9F4C}"/>
+              </a:ext>
+            </a:extLst>
+          </p:cNvPr>
+          <p:cNvSpPr txBox="1"/>
+          <p:nvPr/>
+        </p:nvSpPr>
+        <p:spPr>
+          <a:xfrm>
+            <a:off x="9747419" y="-22583"/>
+            <a:ext cx="1478088" cy="211688"/>
+          </a:xfrm>
+          <a:prstGeom prst="rect">
+            <a:avLst/>
+          </a:prstGeom>
+          <a:solidFill>
+            <a:schemeClr val="bg1"/>
+          </a:solidFill>
+          <a:ln w="12700">
+            <a:noFill/>
+          </a:ln>
+        </p:spPr>
+        <p:style>
+          <a:lnRef idx="2">
+            <a:schemeClr val="accent4"/>
+          </a:lnRef>
+          <a:fillRef idx="1">
+            <a:schemeClr val="lt1"/>
+          </a:fillRef>
+          <a:effectRef idx="0">
+            <a:schemeClr val="accent4"/>
+          </a:effectRef>
+          <a:fontRef idx="minor">
+            <a:schemeClr val="dk1"/>
+          </a:fontRef>
+        </p:style>
+        <p:txBody>
+          <a:bodyPr wrap="none" lIns="52922" tIns="52922" rIns="52922" bIns="0" rtlCol="0" anchor="b"/>
+          <a:lstStyle>
+            <a:defPPr>
+              <a:defRPr lang="en-US"/>
+            </a:defPPr>
+            <a:lvl1pPr algn="ctr">
+              <a:defRPr sz="1000" b="1">
+                <a:latin typeface="Simplon BP Regular"/>
+                <a:cs typeface="Simplon BP Regular"/>
+              </a:defRPr>
+            </a:lvl1pPr>
+            <a:lvl2pPr>
+              <a:defRPr>
+                <a:solidFill>
+                  <a:schemeClr val="dk1"/>
+                </a:solidFill>
+              </a:defRPr>
+            </a:lvl2pPr>
+            <a:lvl3pPr>
+              <a:defRPr>
+                <a:solidFill>
+                  <a:schemeClr val="dk1"/>
+                </a:solidFill>
+              </a:defRPr>
+            </a:lvl3pPr>
+            <a:lvl4pPr>
+              <a:defRPr>
+                <a:solidFill>
+                  <a:schemeClr val="dk1"/>
+                </a:solidFill>
+              </a:defRPr>
+            </a:lvl4pPr>
+            <a:lvl5pPr>
+              <a:defRPr>
+                <a:solidFill>
+                  <a:schemeClr val="dk1"/>
+                </a:solidFill>
+              </a:defRPr>
+            </a:lvl5pPr>
+            <a:lvl6pPr>
+              <a:defRPr>
+                <a:solidFill>
+                  <a:schemeClr val="dk1"/>
+                </a:solidFill>
+              </a:defRPr>
+            </a:lvl6pPr>
+            <a:lvl7pPr>
+              <a:defRPr>
+                <a:solidFill>
+                  <a:schemeClr val="dk1"/>
+                </a:solidFill>
+              </a:defRPr>
+            </a:lvl7pPr>
+            <a:lvl8pPr>
+              <a:defRPr>
+                <a:solidFill>
+                  <a:schemeClr val="dk1"/>
+                </a:solidFill>
+              </a:defRPr>
+            </a:lvl8pPr>
+            <a:lvl9pPr>
+              <a:defRPr>
+                <a:solidFill>
+                  <a:schemeClr val="dk1"/>
+                </a:solidFill>
+              </a:defRPr>
+            </a:lvl9pPr>
+          </a:lstStyle>
+          <a:p>
+            <a:pPr defTabSz="672130"/>
+            <a:r>
+              <a:rPr lang="en-US" sz="1176" b="0" dirty="0">
+                <a:solidFill>
+                  <a:prstClr val="black"/>
+                </a:solidFill>
+                <a:latin typeface="Simplon BP Bold" pitchFamily="2" charset="0"/>
+              </a:rPr>
+              <a:t>    </a:t>
+            </a:r>
+            <a:r>
+              <a:rPr lang="en-US" sz="1176" b="0" dirty="0" err="1">
+                <a:solidFill>
+                  <a:prstClr val="black"/>
+                </a:solidFill>
+                <a:latin typeface="Simplon BP Bold" pitchFamily="2" charset="0"/>
+              </a:rPr>
+              <a:t>Farol</a:t>
+            </a:r>
+            <a:r>
+              <a:rPr lang="en-US" sz="1176" b="0" dirty="0">
+                <a:solidFill>
+                  <a:prstClr val="black"/>
+                </a:solidFill>
+                <a:latin typeface="Simplon BP Bold" pitchFamily="2" charset="0"/>
+              </a:rPr>
+              <a:t> do </a:t>
+            </a:r>
+            <a:r>
+              <a:rPr lang="en-US" sz="1176" b="0" dirty="0" err="1">
+                <a:solidFill>
+                  <a:prstClr val="black"/>
+                </a:solidFill>
+                <a:latin typeface="Simplon BP Bold" pitchFamily="2" charset="0"/>
+              </a:rPr>
+              <a:t>Projeto</a:t>
+            </a:r>
+            <a:r>
+              <a:rPr lang="en-US" sz="1176" b="0" dirty="0">
+                <a:solidFill>
+                  <a:prstClr val="black"/>
+                </a:solidFill>
+                <a:latin typeface="Simplon BP Bold" pitchFamily="2" charset="0"/>
+              </a:rPr>
+              <a:t>   </a:t>
+            </a:r>
+          </a:p>
+        </p:txBody>
+      </p:sp>
+    </p:spTree>
+    <p:extLst>
+      <p:ext uri="{BB962C8B-B14F-4D97-AF65-F5344CB8AC3E}">
+        <p14:creationId xmlns:p14="http://schemas.microsoft.com/office/powerpoint/2010/main" val="2450844482"/>
+      </p:ext>
+    </p:extLst>
+  </p:cSld>
+  <p:clrMapOvr>
+    <a:masterClrMapping/>
+  </p:clrMapOvr>
+</p:sld>
+</file>
+
 <file path=ppt/theme/theme1.xml><?xml version="1.0" encoding="utf-8"?>
 <a:theme xmlns:a="http://schemas.openxmlformats.org/drawingml/2006/main" name="Capas">
   <a:themeElements>

</xml_diff>